<commit_message>
Improve clarity on ONNX discussion
</commit_message>
<xml_diff>
--- a/Whiteboard design session/WDS trainer presentation - MLOps.pptx
+++ b/Whiteboard design session/WDS trainer presentation - MLOps.pptx
@@ -15282,147 +15282,6 @@
           <a:chExt cx="0" cy="0"/>
         </a:xfrm>
       </p:grpSpPr>
-      <p:sp>
-        <p:nvSpPr>
-          <p:cNvPr id="2" name="Title 1"/>
-          <p:cNvSpPr>
-            <a:spLocks noGrp="1"/>
-          </p:cNvSpPr>
-          <p:nvPr>
-            <p:ph type="title"/>
-          </p:nvPr>
-        </p:nvSpPr>
-        <p:spPr>
-          <a:xfrm>
-            <a:off x="291012" y="289511"/>
-            <a:ext cx="11655840" cy="899665"/>
-          </a:xfrm>
-        </p:spPr>
-        <p:txBody>
-          <a:bodyPr>
-            <a:normAutofit/>
-          </a:bodyPr>
-          <a:lstStyle/>
-          <a:p>
-            <a:r>
-              <a:rPr lang="en-US" sz="4400" dirty="0">
-                <a:solidFill>
-                  <a:schemeClr val="tx1"/>
-                </a:solidFill>
-                <a:latin typeface="Segoe UI Light" panose="020B0502040204020203" pitchFamily="34" charset="0"/>
-                <a:cs typeface="Segoe UI Light" panose="020B0502040204020203" pitchFamily="34" charset="0"/>
-              </a:rPr>
-              <a:t>Step 2: Design the solution</a:t>
-            </a:r>
-          </a:p>
-        </p:txBody>
-      </p:sp>
-      <p:sp>
-        <p:nvSpPr>
-          <p:cNvPr id="9" name="TextBox 8">
-            <a:extLst>
-              <a:ext uri="{FF2B5EF4-FFF2-40B4-BE49-F238E27FC236}">
-                <a16:creationId xmlns:a16="http://schemas.microsoft.com/office/drawing/2014/main" id="{0F86F9F9-39B5-4CE6-AF48-9ADAE40EA728}"/>
-              </a:ext>
-            </a:extLst>
-          </p:cNvPr>
-          <p:cNvSpPr txBox="1"/>
-          <p:nvPr/>
-        </p:nvSpPr>
-        <p:spPr>
-          <a:xfrm>
-            <a:off x="362057" y="1741246"/>
-            <a:ext cx="10652686" cy="2930033"/>
-          </a:xfrm>
-          <a:prstGeom prst="rect">
-            <a:avLst/>
-          </a:prstGeom>
-          <a:noFill/>
-        </p:spPr>
-        <p:txBody>
-          <a:bodyPr wrap="square" lIns="182880" tIns="146304" rIns="182880" bIns="146304" rtlCol="0">
-            <a:spAutoFit/>
-          </a:bodyPr>
-          <a:lstStyle/>
-          <a:p>
-            <a:pPr>
-              <a:lnSpc>
-                <a:spcPct val="90000"/>
-              </a:lnSpc>
-              <a:spcAft>
-                <a:spcPts val="600"/>
-              </a:spcAft>
-            </a:pPr>
-            <a:r>
-              <a:rPr lang="en-US" sz="3600" dirty="0">
-                <a:latin typeface="+mj-lt"/>
-              </a:rPr>
-              <a:t>Outcome</a:t>
-            </a:r>
-          </a:p>
-          <a:p>
-            <a:pPr>
-              <a:lnSpc>
-                <a:spcPct val="90000"/>
-              </a:lnSpc>
-              <a:spcAft>
-                <a:spcPts val="600"/>
-              </a:spcAft>
-            </a:pPr>
-            <a:r>
-              <a:rPr lang="en-US" sz="2400" dirty="0">
-                <a:latin typeface="Segoe UI Semilight" panose="020B0402040204020203" pitchFamily="34" charset="0"/>
-                <a:cs typeface="Segoe UI Semilight" panose="020B0402040204020203" pitchFamily="34" charset="0"/>
-              </a:rPr>
-              <a:t>Design a solution and prepare to present the solution to the target customer audience in a 15-minute chalk-talk format. </a:t>
-            </a:r>
-          </a:p>
-          <a:p>
-            <a:pPr>
-              <a:lnSpc>
-                <a:spcPct val="90000"/>
-              </a:lnSpc>
-              <a:spcAft>
-                <a:spcPts val="600"/>
-              </a:spcAft>
-            </a:pPr>
-            <a:endParaRPr lang="en-US" sz="2400" dirty="0"/>
-          </a:p>
-          <a:p>
-            <a:pPr>
-              <a:lnSpc>
-                <a:spcPct val="90000"/>
-              </a:lnSpc>
-              <a:spcAft>
-                <a:spcPts val="600"/>
-              </a:spcAft>
-            </a:pPr>
-            <a:r>
-              <a:rPr lang="en-US" sz="3600" dirty="0">
-                <a:latin typeface="+mj-lt"/>
-              </a:rPr>
-              <a:t>Timeframe</a:t>
-            </a:r>
-          </a:p>
-          <a:p>
-            <a:pPr>
-              <a:lnSpc>
-                <a:spcPct val="90000"/>
-              </a:lnSpc>
-              <a:spcAft>
-                <a:spcPts val="600"/>
-              </a:spcAft>
-            </a:pPr>
-            <a:r>
-              <a:rPr lang="en-US" sz="2400" dirty="0">
-                <a:latin typeface="Segoe UI Semilight" panose="020B0402040204020203" pitchFamily="34" charset="0"/>
-                <a:cs typeface="Segoe UI Semilight" panose="020B0402040204020203" pitchFamily="34" charset="0"/>
-              </a:rPr>
-              <a:t>60 minutes</a:t>
-            </a:r>
-          </a:p>
-        </p:txBody>
-      </p:sp>
       <p:graphicFrame>
         <p:nvGraphicFramePr>
           <p:cNvPr id="4" name="Table 3">
@@ -15794,6 +15653,147 @@
           </a:graphicData>
         </a:graphic>
       </p:graphicFrame>
+      <p:sp>
+        <p:nvSpPr>
+          <p:cNvPr id="9" name="TextBox 8">
+            <a:extLst>
+              <a:ext uri="{FF2B5EF4-FFF2-40B4-BE49-F238E27FC236}">
+                <a16:creationId xmlns:a16="http://schemas.microsoft.com/office/drawing/2014/main" id="{0F86F9F9-39B5-4CE6-AF48-9ADAE40EA728}"/>
+              </a:ext>
+            </a:extLst>
+          </p:cNvPr>
+          <p:cNvSpPr txBox="1"/>
+          <p:nvPr/>
+        </p:nvSpPr>
+        <p:spPr>
+          <a:xfrm>
+            <a:off x="362057" y="1741246"/>
+            <a:ext cx="10652686" cy="2930033"/>
+          </a:xfrm>
+          <a:prstGeom prst="rect">
+            <a:avLst/>
+          </a:prstGeom>
+          <a:noFill/>
+        </p:spPr>
+        <p:txBody>
+          <a:bodyPr wrap="square" lIns="182880" tIns="146304" rIns="182880" bIns="146304" rtlCol="0">
+            <a:spAutoFit/>
+          </a:bodyPr>
+          <a:lstStyle/>
+          <a:p>
+            <a:pPr>
+              <a:lnSpc>
+                <a:spcPct val="90000"/>
+              </a:lnSpc>
+              <a:spcAft>
+                <a:spcPts val="600"/>
+              </a:spcAft>
+            </a:pPr>
+            <a:r>
+              <a:rPr lang="en-US" sz="3600" dirty="0">
+                <a:latin typeface="+mj-lt"/>
+              </a:rPr>
+              <a:t>Outcome</a:t>
+            </a:r>
+          </a:p>
+          <a:p>
+            <a:pPr>
+              <a:lnSpc>
+                <a:spcPct val="90000"/>
+              </a:lnSpc>
+              <a:spcAft>
+                <a:spcPts val="600"/>
+              </a:spcAft>
+            </a:pPr>
+            <a:r>
+              <a:rPr lang="en-US" sz="2400" dirty="0">
+                <a:latin typeface="Segoe UI Semilight" panose="020B0402040204020203" pitchFamily="34" charset="0"/>
+                <a:cs typeface="Segoe UI Semilight" panose="020B0402040204020203" pitchFamily="34" charset="0"/>
+              </a:rPr>
+              <a:t>Design a solution and prepare to present the solution to the target customer audience in a 15-minute chalk-talk format. </a:t>
+            </a:r>
+          </a:p>
+          <a:p>
+            <a:pPr>
+              <a:lnSpc>
+                <a:spcPct val="90000"/>
+              </a:lnSpc>
+              <a:spcAft>
+                <a:spcPts val="600"/>
+              </a:spcAft>
+            </a:pPr>
+            <a:endParaRPr lang="en-US" sz="2400" dirty="0"/>
+          </a:p>
+          <a:p>
+            <a:pPr>
+              <a:lnSpc>
+                <a:spcPct val="90000"/>
+              </a:lnSpc>
+              <a:spcAft>
+                <a:spcPts val="600"/>
+              </a:spcAft>
+            </a:pPr>
+            <a:r>
+              <a:rPr lang="en-US" sz="3600" dirty="0">
+                <a:latin typeface="+mj-lt"/>
+              </a:rPr>
+              <a:t>Timeframe</a:t>
+            </a:r>
+          </a:p>
+          <a:p>
+            <a:pPr>
+              <a:lnSpc>
+                <a:spcPct val="90000"/>
+              </a:lnSpc>
+              <a:spcAft>
+                <a:spcPts val="600"/>
+              </a:spcAft>
+            </a:pPr>
+            <a:r>
+              <a:rPr lang="en-US" sz="2400" dirty="0">
+                <a:latin typeface="Segoe UI Semilight" panose="020B0402040204020203" pitchFamily="34" charset="0"/>
+                <a:cs typeface="Segoe UI Semilight" panose="020B0402040204020203" pitchFamily="34" charset="0"/>
+              </a:rPr>
+              <a:t>60 minutes</a:t>
+            </a:r>
+          </a:p>
+        </p:txBody>
+      </p:sp>
+      <p:sp>
+        <p:nvSpPr>
+          <p:cNvPr id="2" name="Title 1"/>
+          <p:cNvSpPr>
+            <a:spLocks noGrp="1"/>
+          </p:cNvSpPr>
+          <p:nvPr>
+            <p:ph type="title"/>
+          </p:nvPr>
+        </p:nvSpPr>
+        <p:spPr>
+          <a:xfrm>
+            <a:off x="291012" y="289511"/>
+            <a:ext cx="11655840" cy="899665"/>
+          </a:xfrm>
+        </p:spPr>
+        <p:txBody>
+          <a:bodyPr>
+            <a:normAutofit/>
+          </a:bodyPr>
+          <a:lstStyle/>
+          <a:p>
+            <a:r>
+              <a:rPr lang="en-US" sz="4400" dirty="0">
+                <a:solidFill>
+                  <a:schemeClr val="tx1"/>
+                </a:solidFill>
+                <a:latin typeface="Segoe UI Light" panose="020B0502040204020203" pitchFamily="34" charset="0"/>
+                <a:cs typeface="Segoe UI Light" panose="020B0502040204020203" pitchFamily="34" charset="0"/>
+              </a:rPr>
+              <a:t>Step 2: Design the solution</a:t>
+            </a:r>
+          </a:p>
+        </p:txBody>
+      </p:sp>
     </p:spTree>
     <p:extLst>
       <p:ext uri="{BB962C8B-B14F-4D97-AF65-F5344CB8AC3E}">
@@ -15834,36 +15834,6 @@
       </p:grpSpPr>
       <p:sp>
         <p:nvSpPr>
-          <p:cNvPr id="2" name="Title 1"/>
-          <p:cNvSpPr>
-            <a:spLocks noGrp="1"/>
-          </p:cNvSpPr>
-          <p:nvPr>
-            <p:ph type="title"/>
-          </p:nvPr>
-        </p:nvSpPr>
-        <p:spPr/>
-        <p:txBody>
-          <a:bodyPr>
-            <a:normAutofit/>
-          </a:bodyPr>
-          <a:lstStyle/>
-          <a:p>
-            <a:r>
-              <a:rPr lang="en-US" sz="4400" dirty="0">
-                <a:solidFill>
-                  <a:schemeClr val="tx1"/>
-                </a:solidFill>
-                <a:latin typeface="Segoe UI Light" panose="020B0502040204020203" pitchFamily="34" charset="0"/>
-                <a:cs typeface="Segoe UI Light" panose="020B0502040204020203" pitchFamily="34" charset="0"/>
-              </a:rPr>
-              <a:t>Step 3: Present the solution</a:t>
-            </a:r>
-          </a:p>
-        </p:txBody>
-      </p:sp>
-      <p:sp>
-        <p:nvSpPr>
           <p:cNvPr id="9" name="TextBox 8">
             <a:extLst>
               <a:ext uri="{FF2B5EF4-FFF2-40B4-BE49-F238E27FC236}">
@@ -16095,6 +16065,36 @@
               <a:latin typeface="Segoe UI Semilight" panose="020B0402040204020203" pitchFamily="34" charset="0"/>
               <a:cs typeface="Segoe UI Semilight" panose="020B0402040204020203" pitchFamily="34" charset="0"/>
             </a:endParaRPr>
+          </a:p>
+        </p:txBody>
+      </p:sp>
+      <p:sp>
+        <p:nvSpPr>
+          <p:cNvPr id="2" name="Title 1"/>
+          <p:cNvSpPr>
+            <a:spLocks noGrp="1"/>
+          </p:cNvSpPr>
+          <p:nvPr>
+            <p:ph type="title"/>
+          </p:nvPr>
+        </p:nvSpPr>
+        <p:spPr/>
+        <p:txBody>
+          <a:bodyPr>
+            <a:normAutofit/>
+          </a:bodyPr>
+          <a:lstStyle/>
+          <a:p>
+            <a:r>
+              <a:rPr lang="en-US" sz="4400" dirty="0">
+                <a:solidFill>
+                  <a:schemeClr val="tx1"/>
+                </a:solidFill>
+                <a:latin typeface="Segoe UI Light" panose="020B0502040204020203" pitchFamily="34" charset="0"/>
+                <a:cs typeface="Segoe UI Light" panose="020B0502040204020203" pitchFamily="34" charset="0"/>
+              </a:rPr>
+              <a:t>Step 3: Present the solution</a:t>
+            </a:r>
           </a:p>
         </p:txBody>
       </p:sp>
@@ -16138,36 +16138,6 @@
       </p:grpSpPr>
       <p:sp>
         <p:nvSpPr>
-          <p:cNvPr id="2" name="Title 1"/>
-          <p:cNvSpPr>
-            <a:spLocks noGrp="1"/>
-          </p:cNvSpPr>
-          <p:nvPr>
-            <p:ph type="title"/>
-          </p:nvPr>
-        </p:nvSpPr>
-        <p:spPr/>
-        <p:txBody>
-          <a:bodyPr>
-            <a:normAutofit/>
-          </a:bodyPr>
-          <a:lstStyle/>
-          <a:p>
-            <a:r>
-              <a:rPr lang="en-US" sz="4400" dirty="0">
-                <a:solidFill>
-                  <a:schemeClr val="tx1"/>
-                </a:solidFill>
-                <a:latin typeface="Segoe UI Light" panose="020B0502040204020203" pitchFamily="34" charset="0"/>
-                <a:cs typeface="Segoe UI Light" panose="020B0502040204020203" pitchFamily="34" charset="0"/>
-              </a:rPr>
-              <a:t>Wrap-up</a:t>
-            </a:r>
-          </a:p>
-        </p:txBody>
-      </p:sp>
-      <p:sp>
-        <p:nvSpPr>
           <p:cNvPr id="9" name="TextBox 8">
             <a:extLst>
               <a:ext uri="{FF2B5EF4-FFF2-40B4-BE49-F238E27FC236}">
@@ -16285,6 +16255,36 @@
                 <a:cs typeface="Segoe UI Semilight" panose="020B0402040204020203" pitchFamily="34" charset="0"/>
               </a:rPr>
               <a:t>15 minutes</a:t>
+            </a:r>
+          </a:p>
+        </p:txBody>
+      </p:sp>
+      <p:sp>
+        <p:nvSpPr>
+          <p:cNvPr id="2" name="Title 1"/>
+          <p:cNvSpPr>
+            <a:spLocks noGrp="1"/>
+          </p:cNvSpPr>
+          <p:nvPr>
+            <p:ph type="title"/>
+          </p:nvPr>
+        </p:nvSpPr>
+        <p:spPr/>
+        <p:txBody>
+          <a:bodyPr>
+            <a:normAutofit/>
+          </a:bodyPr>
+          <a:lstStyle/>
+          <a:p>
+            <a:r>
+              <a:rPr lang="en-US" sz="4400" dirty="0">
+                <a:solidFill>
+                  <a:schemeClr val="tx1"/>
+                </a:solidFill>
+                <a:latin typeface="Segoe UI Light" panose="020B0502040204020203" pitchFamily="34" charset="0"/>
+                <a:cs typeface="Segoe UI Light" panose="020B0502040204020203" pitchFamily="34" charset="0"/>
+              </a:rPr>
+              <a:t>Wrap-up</a:t>
             </a:r>
           </a:p>
         </p:txBody>
@@ -16471,49 +16471,6 @@
           <a:chExt cx="0" cy="0"/>
         </a:xfrm>
       </p:grpSpPr>
-      <p:sp>
-        <p:nvSpPr>
-          <p:cNvPr id="2" name="Title 1"/>
-          <p:cNvSpPr>
-            <a:spLocks noGrp="1"/>
-          </p:cNvSpPr>
-          <p:nvPr>
-            <p:ph type="title"/>
-          </p:nvPr>
-        </p:nvSpPr>
-        <p:spPr/>
-        <p:txBody>
-          <a:bodyPr>
-            <a:normAutofit fontScale="90000"/>
-          </a:bodyPr>
-          <a:lstStyle/>
-          <a:p>
-            <a:r>
-              <a:rPr lang="en-US" sz="4900" dirty="0">
-                <a:solidFill>
-                  <a:schemeClr val="tx1"/>
-                </a:solidFill>
-                <a:cs typeface="Segoe UI" panose="020B0502040204020203" pitchFamily="34" charset="0"/>
-              </a:rPr>
-              <a:t>Preferred solution</a:t>
-            </a:r>
-            <a:br>
-              <a:rPr lang="en-US" dirty="0">
-                <a:solidFill>
-                  <a:schemeClr val="tx1"/>
-                </a:solidFill>
-                <a:latin typeface="Segoe UI" panose="020B0502040204020203" pitchFamily="34" charset="0"/>
-              </a:rPr>
-            </a:br>
-            <a:endParaRPr lang="en-US" sz="3236" dirty="0">
-              <a:solidFill>
-                <a:schemeClr val="tx1"/>
-              </a:solidFill>
-              <a:latin typeface="Segoe UI" panose="020B0502040204020203" pitchFamily="34" charset="0"/>
-            </a:endParaRPr>
-          </a:p>
-        </p:txBody>
-      </p:sp>
       <p:pic>
         <p:nvPicPr>
           <p:cNvPr id="6" name="Picture 5" descr="The architectural diagram of the preferred solution">
@@ -16550,6 +16507,49 @@
           </a:prstGeom>
         </p:spPr>
       </p:pic>
+      <p:sp>
+        <p:nvSpPr>
+          <p:cNvPr id="2" name="Title 1"/>
+          <p:cNvSpPr>
+            <a:spLocks noGrp="1"/>
+          </p:cNvSpPr>
+          <p:nvPr>
+            <p:ph type="title"/>
+          </p:nvPr>
+        </p:nvSpPr>
+        <p:spPr/>
+        <p:txBody>
+          <a:bodyPr>
+            <a:normAutofit fontScale="90000"/>
+          </a:bodyPr>
+          <a:lstStyle/>
+          <a:p>
+            <a:r>
+              <a:rPr lang="en-US" sz="4900" dirty="0">
+                <a:solidFill>
+                  <a:schemeClr val="tx1"/>
+                </a:solidFill>
+                <a:cs typeface="Segoe UI" panose="020B0502040204020203" pitchFamily="34" charset="0"/>
+              </a:rPr>
+              <a:t>Preferred solution - architecture</a:t>
+            </a:r>
+            <a:br>
+              <a:rPr lang="en-US" dirty="0">
+                <a:solidFill>
+                  <a:schemeClr val="tx1"/>
+                </a:solidFill>
+                <a:latin typeface="Segoe UI" panose="020B0502040204020203" pitchFamily="34" charset="0"/>
+              </a:rPr>
+            </a:br>
+            <a:endParaRPr lang="en-US" sz="3236" dirty="0">
+              <a:solidFill>
+                <a:schemeClr val="tx1"/>
+              </a:solidFill>
+              <a:latin typeface="Segoe UI" panose="020B0502040204020203" pitchFamily="34" charset="0"/>
+            </a:endParaRPr>
+          </a:p>
+        </p:txBody>
+      </p:sp>
     </p:spTree>
     <p:extLst>
       <p:ext uri="{BB962C8B-B14F-4D97-AF65-F5344CB8AC3E}">
@@ -16737,7 +16737,7 @@
                 </a:solidFill>
                 <a:cs typeface="Segoe UI" panose="020B0502040204020203" pitchFamily="34" charset="0"/>
               </a:rPr>
-              <a:t>Preferred solution</a:t>
+              <a:t>Preferred solution – component classification (1)</a:t>
             </a:r>
             <a:br>
               <a:rPr lang="en-US" dirty="0">
@@ -16958,7 +16958,7 @@
                 </a:solidFill>
                 <a:cs typeface="Segoe UI" panose="020B0502040204020203" pitchFamily="34" charset="0"/>
               </a:rPr>
-              <a:t>Preferred solution</a:t>
+              <a:t>Preferred solution – component classification (2,3,4)</a:t>
             </a:r>
             <a:br>
               <a:rPr lang="en-US" dirty="0">
@@ -17148,7 +17148,7 @@
                 </a:solidFill>
                 <a:cs typeface="Segoe UI" panose="020B0502040204020203" pitchFamily="34" charset="0"/>
               </a:rPr>
-              <a:t>Preferred solution</a:t>
+              <a:t>Preferred solution – component classification (5)</a:t>
             </a:r>
             <a:br>
               <a:rPr lang="en-US" dirty="0">
@@ -17317,7 +17317,7 @@
                 </a:solidFill>
                 <a:cs typeface="Segoe UI" panose="020B0502040204020203" pitchFamily="34" charset="0"/>
               </a:rPr>
-              <a:t>Preferred solution</a:t>
+              <a:t>Preferred solution – component classification (6.1)</a:t>
             </a:r>
             <a:br>
               <a:rPr lang="en-US" dirty="0">
@@ -17520,7 +17520,7 @@
                 </a:solidFill>
                 <a:cs typeface="Segoe UI" panose="020B0502040204020203" pitchFamily="34" charset="0"/>
               </a:rPr>
-              <a:t>Preferred solution</a:t>
+              <a:t>Preferred solution – component classification (6.2)</a:t>
             </a:r>
             <a:br>
               <a:rPr lang="en-US" dirty="0">
@@ -17587,37 +17587,7 @@
       </p:grpSpPr>
       <p:sp>
         <p:nvSpPr>
-          <p:cNvPr id="2" name="Title 1"/>
-          <p:cNvSpPr>
-            <a:spLocks noGrp="1"/>
-          </p:cNvSpPr>
-          <p:nvPr>
-            <p:ph type="title"/>
-          </p:nvPr>
-        </p:nvSpPr>
-        <p:spPr/>
-        <p:txBody>
-          <a:bodyPr>
-            <a:normAutofit/>
-          </a:bodyPr>
-          <a:lstStyle/>
-          <a:p>
-            <a:r>
-              <a:rPr lang="en-US" sz="4400" dirty="0">
-                <a:solidFill>
-                  <a:schemeClr val="tx1"/>
-                </a:solidFill>
-                <a:latin typeface="Segoe UI Light" panose="020B0502040204020203" pitchFamily="34" charset="0"/>
-                <a:cs typeface="Segoe UI Light" panose="020B0502040204020203" pitchFamily="34" charset="0"/>
-              </a:rPr>
-              <a:t>Abstract and learning objectives</a:t>
-            </a:r>
-          </a:p>
-        </p:txBody>
-      </p:sp>
-      <p:sp>
-        <p:nvSpPr>
-          <p:cNvPr id="9" name="TextBox 8">
+          <p:cNvPr id="9" name="TextBox 2">
             <a:extLst>
               <a:ext uri="{FF2B5EF4-FFF2-40B4-BE49-F238E27FC236}">
                 <a16:creationId xmlns:a16="http://schemas.microsoft.com/office/drawing/2014/main" id="{0F86F9F9-39B5-4CE6-AF48-9ADAE40EA728}"/>
@@ -17645,7 +17615,7 @@
           <a:p>
             <a:r>
               <a:rPr lang="en-US" dirty="0"/>
-              <a:t>In this whiteboard design session, you will work in a group to design a process Trey Research can follow for orchestrating and deploying updates to the application and the deep learning model in a unified way. You will learn how Trey Research can leverage Deep Learning technologies to scan through their vehicle specification documents to find compliance issues with new regulations. You will standardize the model format to ONNX and observe how this simplifies inference runtime code, enabling pluggability of different models and targeting a broad range of runtime environments and most importantly improves inferencing speed over the native model. You will design a DevOps pipeline to coordinate retrieving the latest best model from the model registry, packaging the web application, deploying the web application and inferencing web service. You will also learn how to monitor the model's performance after it is deployed so Trey Research can be proactive with performance issues.</a:t>
+              <a:t>In this whiteboard design session, you will work in a group to design a process Trey Research can follow for orchestrating and deploying updates to the application and the deep learning model in a unified way. You will learn how Trey Research can leverage Deep Learning technologies to scan through their vehicle specification documents to find compliance issues with new regulations. You will design a DevOps pipeline to coordinate retrieving the latest best model from the model registry, packaging the web application, deploying the web application and inferencing web service. You will learn how to monitor the model's performance after it is deployed so Trey Research can be proactive with performance issues. You will investigate the potential to standardize the model format to ONNX to simplify inference runtime code (by enabling pluggability of different models and targeting a broad range of runtime environments) and most importantly to improve inferencing speed over the native model.</a:t>
             </a:r>
           </a:p>
           <a:p>
@@ -17667,6 +17637,36 @@
               </a:spcAft>
             </a:pPr>
             <a:endParaRPr lang="en-US" sz="2400" dirty="0"/>
+          </a:p>
+        </p:txBody>
+      </p:sp>
+      <p:sp>
+        <p:nvSpPr>
+          <p:cNvPr id="2" name="Title 1"/>
+          <p:cNvSpPr>
+            <a:spLocks noGrp="1"/>
+          </p:cNvSpPr>
+          <p:nvPr>
+            <p:ph type="title"/>
+          </p:nvPr>
+        </p:nvSpPr>
+        <p:spPr/>
+        <p:txBody>
+          <a:bodyPr>
+            <a:normAutofit/>
+          </a:bodyPr>
+          <a:lstStyle/>
+          <a:p>
+            <a:r>
+              <a:rPr lang="en-US" sz="4400" dirty="0">
+                <a:solidFill>
+                  <a:schemeClr val="tx1"/>
+                </a:solidFill>
+                <a:latin typeface="Segoe UI Light" panose="020B0502040204020203" pitchFamily="34" charset="0"/>
+                <a:cs typeface="Segoe UI Light" panose="020B0502040204020203" pitchFamily="34" charset="0"/>
+              </a:rPr>
+              <a:t>Abstract and learning objectives</a:t>
+            </a:r>
           </a:p>
         </p:txBody>
       </p:sp>
@@ -17708,109 +17708,6 @@
           <a:chExt cx="0" cy="0"/>
         </a:xfrm>
       </p:grpSpPr>
-      <p:sp>
-        <p:nvSpPr>
-          <p:cNvPr id="2" name="Title 1"/>
-          <p:cNvSpPr>
-            <a:spLocks noGrp="1"/>
-          </p:cNvSpPr>
-          <p:nvPr>
-            <p:ph type="title"/>
-          </p:nvPr>
-        </p:nvSpPr>
-        <p:spPr/>
-        <p:txBody>
-          <a:bodyPr>
-            <a:normAutofit fontScale="90000"/>
-          </a:bodyPr>
-          <a:lstStyle/>
-          <a:p>
-            <a:r>
-              <a:rPr lang="en-US" sz="4900" dirty="0">
-                <a:solidFill>
-                  <a:schemeClr val="tx1"/>
-                </a:solidFill>
-                <a:cs typeface="Segoe UI" panose="020B0502040204020203" pitchFamily="34" charset="0"/>
-              </a:rPr>
-              <a:t>Preferred solution</a:t>
-            </a:r>
-            <a:br>
-              <a:rPr lang="en-US" dirty="0">
-                <a:solidFill>
-                  <a:schemeClr val="tx1"/>
-                </a:solidFill>
-                <a:latin typeface="Segoe UI" panose="020B0502040204020203" pitchFamily="34" charset="0"/>
-              </a:rPr>
-            </a:br>
-            <a:endParaRPr lang="en-US" sz="3236" dirty="0">
-              <a:solidFill>
-                <a:schemeClr val="tx1"/>
-              </a:solidFill>
-              <a:latin typeface="Segoe UI" panose="020B0502040204020203" pitchFamily="34" charset="0"/>
-            </a:endParaRPr>
-          </a:p>
-        </p:txBody>
-      </p:sp>
-      <p:sp>
-        <p:nvSpPr>
-          <p:cNvPr id="3" name="Content Placeholder 2"/>
-          <p:cNvSpPr>
-            <a:spLocks noGrp="1"/>
-          </p:cNvSpPr>
-          <p:nvPr>
-            <p:ph type="body" sz="quarter" idx="10"/>
-          </p:nvPr>
-        </p:nvSpPr>
-        <p:spPr>
-          <a:xfrm>
-            <a:off x="269239" y="1189176"/>
-            <a:ext cx="11653523" cy="5293685"/>
-          </a:xfrm>
-        </p:spPr>
-        <p:txBody>
-          <a:bodyPr>
-            <a:noAutofit/>
-          </a:bodyPr>
-          <a:lstStyle/>
-          <a:p>
-            <a:pPr marL="0" indent="0">
-              <a:buNone/>
-            </a:pPr>
-            <a:r>
-              <a:rPr lang="en-US" sz="1800" b="1" dirty="0"/>
-              <a:t>Component Classification</a:t>
-            </a:r>
-          </a:p>
-          <a:p>
-            <a:pPr marL="0" indent="0">
-              <a:buNone/>
-            </a:pPr>
-            <a:endParaRPr lang="en-US" sz="1800" i="1" dirty="0"/>
-          </a:p>
-          <a:p>
-            <a:pPr marL="342900" indent="-342900">
-              <a:buAutoNum type="arabicPeriod" startAt="7"/>
-            </a:pPr>
-            <a:r>
-              <a:rPr lang="en-US" sz="1800" i="1" dirty="0"/>
-              <a:t>Diagram what happens when you run a machine learning pipeline in Azure Machine Learning.</a:t>
-            </a:r>
-          </a:p>
-          <a:p>
-            <a:pPr marL="0" indent="0">
-              <a:spcAft>
-                <a:spcPts val="882"/>
-              </a:spcAft>
-              <a:buNone/>
-            </a:pPr>
-            <a:endParaRPr lang="en-US" sz="1800" dirty="0">
-              <a:solidFill>
-                <a:schemeClr val="tx1"/>
-              </a:solidFill>
-            </a:endParaRPr>
-          </a:p>
-        </p:txBody>
-      </p:sp>
       <p:pic>
         <p:nvPicPr>
           <p:cNvPr id="5" name="Picture 4" descr="Process diagram showing the activities that happen when running a pipeline, as described in the speaker notes.">
@@ -17847,6 +17744,125 @@
           </a:prstGeom>
         </p:spPr>
       </p:pic>
+      <p:sp>
+        <p:nvSpPr>
+          <p:cNvPr id="3" name="Content Placeholder 2"/>
+          <p:cNvSpPr>
+            <a:spLocks noGrp="1"/>
+          </p:cNvSpPr>
+          <p:nvPr>
+            <p:ph type="body" sz="quarter" idx="10"/>
+          </p:nvPr>
+        </p:nvSpPr>
+        <p:spPr>
+          <a:xfrm>
+            <a:off x="269239" y="1189176"/>
+            <a:ext cx="11653523" cy="5293685"/>
+          </a:xfrm>
+        </p:spPr>
+        <p:txBody>
+          <a:bodyPr>
+            <a:noAutofit/>
+          </a:bodyPr>
+          <a:lstStyle/>
+          <a:p>
+            <a:pPr marL="0" indent="0">
+              <a:buNone/>
+            </a:pPr>
+            <a:r>
+              <a:rPr lang="en-US" sz="1800" b="1" dirty="0"/>
+              <a:t>Component Classification</a:t>
+            </a:r>
+          </a:p>
+          <a:p>
+            <a:pPr marL="0" indent="0">
+              <a:buNone/>
+            </a:pPr>
+            <a:endParaRPr lang="en-US" sz="1800" i="1" dirty="0"/>
+          </a:p>
+          <a:p>
+            <a:pPr marL="342900" indent="-342900">
+              <a:buAutoNum type="arabicPeriod" startAt="7"/>
+            </a:pPr>
+            <a:r>
+              <a:rPr lang="en-US" sz="1800" i="1" dirty="0"/>
+              <a:t>Diagram what happens when you run a machine learning pipeline in Azure Machine Learning.</a:t>
+            </a:r>
+          </a:p>
+          <a:p>
+            <a:pPr marL="0" indent="0">
+              <a:spcAft>
+                <a:spcPts val="882"/>
+              </a:spcAft>
+              <a:buNone/>
+            </a:pPr>
+            <a:endParaRPr lang="en-US" sz="1800" dirty="0">
+              <a:solidFill>
+                <a:schemeClr val="tx1"/>
+              </a:solidFill>
+            </a:endParaRPr>
+          </a:p>
+        </p:txBody>
+      </p:sp>
+      <p:sp>
+        <p:nvSpPr>
+          <p:cNvPr id="2" name="Title 1"/>
+          <p:cNvSpPr>
+            <a:spLocks noGrp="1"/>
+          </p:cNvSpPr>
+          <p:nvPr>
+            <p:ph type="title"/>
+          </p:nvPr>
+        </p:nvSpPr>
+        <p:spPr/>
+        <p:txBody>
+          <a:bodyPr>
+            <a:normAutofit fontScale="90000"/>
+          </a:bodyPr>
+          <a:lstStyle/>
+          <a:p>
+            <a:r>
+              <a:rPr lang="en-US" sz="4900" dirty="0">
+                <a:solidFill>
+                  <a:schemeClr val="tx1"/>
+                </a:solidFill>
+                <a:cs typeface="Segoe UI" panose="020B0502040204020203" pitchFamily="34" charset="0"/>
+              </a:rPr>
+              <a:t>Preferred solution - </a:t>
+            </a:r>
+            <a:r>
+              <a:rPr lang="en-US" sz="4800" dirty="0">
+                <a:solidFill>
+                  <a:schemeClr val="tx1"/>
+                </a:solidFill>
+              </a:rPr>
+              <a:t>component classification (7)</a:t>
+            </a:r>
+            <a:br>
+              <a:rPr lang="en-US" dirty="0">
+                <a:solidFill>
+                  <a:schemeClr val="tx1"/>
+                </a:solidFill>
+                <a:latin typeface="Segoe UI" panose="020B0502040204020203" pitchFamily="34" charset="0"/>
+              </a:rPr>
+            </a:br>
+            <a:br>
+              <a:rPr lang="en-US" dirty="0">
+                <a:solidFill>
+                  <a:schemeClr val="tx1"/>
+                </a:solidFill>
+                <a:latin typeface="Segoe UI" panose="020B0502040204020203" pitchFamily="34" charset="0"/>
+              </a:rPr>
+            </a:br>
+            <a:endParaRPr lang="en-US" sz="3236" dirty="0">
+              <a:solidFill>
+                <a:schemeClr val="tx1"/>
+              </a:solidFill>
+              <a:latin typeface="Segoe UI" panose="020B0502040204020203" pitchFamily="34" charset="0"/>
+            </a:endParaRPr>
+          </a:p>
+        </p:txBody>
+      </p:sp>
     </p:spTree>
     <p:extLst>
       <p:ext uri="{BB962C8B-B14F-4D97-AF65-F5344CB8AC3E}">
@@ -18037,7 +18053,7 @@
         <p:spPr/>
         <p:txBody>
           <a:bodyPr>
-            <a:normAutofit fontScale="90000"/>
+            <a:normAutofit/>
           </a:bodyPr>
           <a:lstStyle/>
           <a:p>
@@ -18048,16 +18064,26 @@
                 </a:solidFill>
                 <a:cs typeface="Segoe UI" panose="020B0502040204020203" pitchFamily="34" charset="0"/>
               </a:rPr>
-              <a:t>Preferred solution</a:t>
-            </a:r>
-            <a:br>
-              <a:rPr lang="en-US" dirty="0">
+              <a:t>Preferred solution – </a:t>
+            </a:r>
+            <a:r>
+              <a:rPr lang="en-US" sz="4900" dirty="0" err="1">
                 <a:solidFill>
                   <a:schemeClr val="tx1"/>
                 </a:solidFill>
-                <a:latin typeface="Segoe UI" panose="020B0502040204020203" pitchFamily="34" charset="0"/>
+                <a:cs typeface="Segoe UI" panose="020B0502040204020203" pitchFamily="34" charset="0"/>
               </a:rPr>
-            </a:br>
+              <a:t>MLOps</a:t>
+            </a:r>
+            <a:r>
+              <a:rPr lang="en-US" sz="4900" dirty="0">
+                <a:solidFill>
+                  <a:schemeClr val="tx1"/>
+                </a:solidFill>
+                <a:cs typeface="Segoe UI" panose="020B0502040204020203" pitchFamily="34" charset="0"/>
+              </a:rPr>
+              <a:t> (1,2,3) </a:t>
+            </a:r>
             <a:endParaRPr lang="en-US" sz="3236" dirty="0">
               <a:solidFill>
                 <a:schemeClr val="tx1"/>
@@ -18286,7 +18312,25 @@
                 </a:solidFill>
                 <a:cs typeface="Segoe UI" panose="020B0502040204020203" pitchFamily="34" charset="0"/>
               </a:rPr>
-              <a:t>Preferred solution</a:t>
+              <a:t>Preferred solution – </a:t>
+            </a:r>
+            <a:r>
+              <a:rPr lang="en-US" sz="4900" dirty="0" err="1">
+                <a:solidFill>
+                  <a:schemeClr val="tx1"/>
+                </a:solidFill>
+                <a:cs typeface="Segoe UI" panose="020B0502040204020203" pitchFamily="34" charset="0"/>
+              </a:rPr>
+              <a:t>MLOps</a:t>
+            </a:r>
+            <a:r>
+              <a:rPr lang="en-US" sz="4900" dirty="0">
+                <a:solidFill>
+                  <a:schemeClr val="tx1"/>
+                </a:solidFill>
+                <a:cs typeface="Segoe UI" panose="020B0502040204020203" pitchFamily="34" charset="0"/>
+              </a:rPr>
+              <a:t> (4)</a:t>
             </a:r>
             <a:br>
               <a:rPr lang="en-US" dirty="0">
@@ -18482,7 +18526,25 @@
                 </a:solidFill>
                 <a:cs typeface="Segoe UI" panose="020B0502040204020203" pitchFamily="34" charset="0"/>
               </a:rPr>
-              <a:t>Preferred solution</a:t>
+              <a:t>Preferred solution – </a:t>
+            </a:r>
+            <a:r>
+              <a:rPr lang="en-US" sz="4900" dirty="0" err="1">
+                <a:solidFill>
+                  <a:schemeClr val="tx1"/>
+                </a:solidFill>
+                <a:cs typeface="Segoe UI" panose="020B0502040204020203" pitchFamily="34" charset="0"/>
+              </a:rPr>
+              <a:t>MLOps</a:t>
+            </a:r>
+            <a:r>
+              <a:rPr lang="en-US" sz="4900" dirty="0">
+                <a:solidFill>
+                  <a:schemeClr val="tx1"/>
+                </a:solidFill>
+                <a:cs typeface="Segoe UI" panose="020B0502040204020203" pitchFamily="34" charset="0"/>
+              </a:rPr>
+              <a:t> (5)</a:t>
             </a:r>
             <a:br>
               <a:rPr lang="en-US" dirty="0">
@@ -18672,7 +18734,25 @@
                 </a:solidFill>
                 <a:cs typeface="Segoe UI" panose="020B0502040204020203" pitchFamily="34" charset="0"/>
               </a:rPr>
-              <a:t>Preferred solution</a:t>
+              <a:t>Preferred solution – </a:t>
+            </a:r>
+            <a:r>
+              <a:rPr lang="en-US" sz="4900" dirty="0" err="1">
+                <a:solidFill>
+                  <a:schemeClr val="tx1"/>
+                </a:solidFill>
+                <a:cs typeface="Segoe UI" panose="020B0502040204020203" pitchFamily="34" charset="0"/>
+              </a:rPr>
+              <a:t>MLOps</a:t>
+            </a:r>
+            <a:r>
+              <a:rPr lang="en-US" sz="4900" dirty="0">
+                <a:solidFill>
+                  <a:schemeClr val="tx1"/>
+                </a:solidFill>
+                <a:cs typeface="Segoe UI" panose="020B0502040204020203" pitchFamily="34" charset="0"/>
+              </a:rPr>
+              <a:t> (6)</a:t>
             </a:r>
             <a:br>
               <a:rPr lang="en-US" dirty="0">
@@ -18865,7 +18945,7 @@
                 </a:solidFill>
                 <a:cs typeface="Segoe UI" panose="020B0502040204020203" pitchFamily="34" charset="0"/>
               </a:rPr>
-              <a:t>Preferred solution</a:t>
+              <a:t>Preferred solution – monitoring (1)</a:t>
             </a:r>
             <a:br>
               <a:rPr lang="en-US" dirty="0">
@@ -19076,7 +19156,7 @@
                 </a:solidFill>
                 <a:cs typeface="Segoe UI" panose="020B0502040204020203" pitchFamily="34" charset="0"/>
               </a:rPr>
-              <a:t>Preferred solution</a:t>
+              <a:t>Preferred solution – monitoring (2)</a:t>
             </a:r>
             <a:br>
               <a:rPr lang="en-US" dirty="0">
@@ -19422,7 +19502,7 @@
                 </a:solidFill>
                 <a:cs typeface="Segoe UI" panose="020B0502040204020203" pitchFamily="34" charset="0"/>
               </a:rPr>
-              <a:t>Preferred objections handling</a:t>
+              <a:t>Preferred objections handling - continued</a:t>
             </a:r>
             <a:br>
               <a:rPr lang="en-US" dirty="0">
@@ -19642,36 +19722,6 @@
       </p:grpSpPr>
       <p:sp>
         <p:nvSpPr>
-          <p:cNvPr id="2" name="Title 1"/>
-          <p:cNvSpPr>
-            <a:spLocks noGrp="1"/>
-          </p:cNvSpPr>
-          <p:nvPr>
-            <p:ph type="title"/>
-          </p:nvPr>
-        </p:nvSpPr>
-        <p:spPr/>
-        <p:txBody>
-          <a:bodyPr>
-            <a:normAutofit/>
-          </a:bodyPr>
-          <a:lstStyle/>
-          <a:p>
-            <a:r>
-              <a:rPr lang="en-US" sz="4400" dirty="0">
-                <a:solidFill>
-                  <a:schemeClr val="tx1"/>
-                </a:solidFill>
-                <a:latin typeface="Segoe UI Light" panose="020B0502040204020203" pitchFamily="34" charset="0"/>
-                <a:cs typeface="Segoe UI Light" panose="020B0502040204020203" pitchFamily="34" charset="0"/>
-              </a:rPr>
-              <a:t>Step 1: Review the customer case study</a:t>
-            </a:r>
-          </a:p>
-        </p:txBody>
-      </p:sp>
-      <p:sp>
-        <p:nvSpPr>
           <p:cNvPr id="9" name="TextBox 8">
             <a:extLst>
               <a:ext uri="{FF2B5EF4-FFF2-40B4-BE49-F238E27FC236}">
@@ -19772,6 +19822,36 @@
                 <a:cs typeface="Segoe UI Semilight" panose="020B0402040204020203" pitchFamily="34" charset="0"/>
               </a:rPr>
               <a:t>15 minutes</a:t>
+            </a:r>
+          </a:p>
+        </p:txBody>
+      </p:sp>
+      <p:sp>
+        <p:nvSpPr>
+          <p:cNvPr id="2" name="Title 1"/>
+          <p:cNvSpPr>
+            <a:spLocks noGrp="1"/>
+          </p:cNvSpPr>
+          <p:nvPr>
+            <p:ph type="title"/>
+          </p:nvPr>
+        </p:nvSpPr>
+        <p:spPr/>
+        <p:txBody>
+          <a:bodyPr>
+            <a:normAutofit/>
+          </a:bodyPr>
+          <a:lstStyle/>
+          <a:p>
+            <a:r>
+              <a:rPr lang="en-US" sz="4400" dirty="0">
+                <a:solidFill>
+                  <a:schemeClr val="tx1"/>
+                </a:solidFill>
+                <a:latin typeface="Segoe UI Light" panose="020B0502040204020203" pitchFamily="34" charset="0"/>
+                <a:cs typeface="Segoe UI Light" panose="020B0502040204020203" pitchFamily="34" charset="0"/>
+              </a:rPr>
+              <a:t>Step 1: Review the customer case study</a:t>
             </a:r>
           </a:p>
         </p:txBody>
@@ -19814,115 +19894,9 @@
           <a:chExt cx="0" cy="0"/>
         </a:xfrm>
       </p:grpSpPr>
-      <p:sp>
-        <p:nvSpPr>
-          <p:cNvPr id="2" name="Title 1"/>
-          <p:cNvSpPr>
-            <a:spLocks noGrp="1"/>
-          </p:cNvSpPr>
-          <p:nvPr>
-            <p:ph type="title"/>
-          </p:nvPr>
-        </p:nvSpPr>
-        <p:spPr/>
-        <p:txBody>
-          <a:bodyPr>
-            <a:normAutofit fontScale="90000"/>
-          </a:bodyPr>
-          <a:lstStyle/>
-          <a:p>
-            <a:r>
-              <a:rPr lang="en-US" sz="4900" dirty="0">
-                <a:solidFill>
-                  <a:schemeClr val="tx1"/>
-                </a:solidFill>
-                <a:cs typeface="Segoe UI" panose="020B0502040204020203" pitchFamily="34" charset="0"/>
-              </a:rPr>
-              <a:t>Customer situation</a:t>
-            </a:r>
-            <a:br>
-              <a:rPr lang="en-US" dirty="0">
-                <a:solidFill>
-                  <a:schemeClr val="tx1"/>
-                </a:solidFill>
-                <a:latin typeface="Segoe UI" panose="020B0502040204020203" pitchFamily="34" charset="0"/>
-              </a:rPr>
-            </a:br>
-            <a:endParaRPr lang="en-US" sz="3236" dirty="0">
-              <a:solidFill>
-                <a:schemeClr val="tx1"/>
-              </a:solidFill>
-              <a:latin typeface="Segoe UI" panose="020B0502040204020203" pitchFamily="34" charset="0"/>
-            </a:endParaRPr>
-          </a:p>
-        </p:txBody>
-      </p:sp>
-      <p:sp>
-        <p:nvSpPr>
-          <p:cNvPr id="3" name="Content Placeholder 2"/>
-          <p:cNvSpPr>
-            <a:spLocks noGrp="1"/>
-          </p:cNvSpPr>
-          <p:nvPr>
-            <p:ph type="body" sz="quarter" idx="10"/>
-          </p:nvPr>
-        </p:nvSpPr>
-        <p:spPr>
-          <a:xfrm>
-            <a:off x="269239" y="1189177"/>
-            <a:ext cx="8675469" cy="5192168"/>
-          </a:xfrm>
-        </p:spPr>
-        <p:txBody>
-          <a:bodyPr>
-            <a:noAutofit/>
-          </a:bodyPr>
-          <a:lstStyle/>
-          <a:p>
-            <a:r>
-              <a:rPr lang="en-US" sz="2400" dirty="0"/>
-              <a:t>Trey Research Inc. delivers innovative solutions for manufacturers.</a:t>
-            </a:r>
-          </a:p>
-          <a:p>
-            <a:r>
-              <a:rPr lang="en-US" sz="2400" dirty="0"/>
-              <a:t>They specialize in identifying and solving problems for manufacturers that can run the range from automating away mundane but time-intensive processes to delivering cutting edge approaches that provide new opportunities for their manufacturing clients. </a:t>
-            </a:r>
-          </a:p>
-          <a:p>
-            <a:r>
-              <a:rPr lang="en-US" sz="2400" dirty="0"/>
-              <a:t>Trey Research has decades specializing in data science and application development that until now were separate units. </a:t>
-            </a:r>
-          </a:p>
-          <a:p>
-            <a:r>
-              <a:rPr lang="en-US" sz="2400" dirty="0"/>
-              <a:t>They have seen the value created by the ad-hoc synergies between data science and app development, but they would like to unlock the greater, long term value as they formalize their approach by combining the two units into one and follow one standardized process for operationalizing their innovations.</a:t>
-            </a:r>
-          </a:p>
-          <a:p>
-            <a:endParaRPr lang="en-US" sz="2400" dirty="0"/>
-          </a:p>
-          <a:p>
-            <a:pPr marL="0" indent="0">
-              <a:spcAft>
-                <a:spcPts val="882"/>
-              </a:spcAft>
-              <a:buNone/>
-            </a:pPr>
-            <a:endParaRPr lang="en-US" sz="2400" dirty="0">
-              <a:solidFill>
-                <a:schemeClr val="tx1"/>
-              </a:solidFill>
-            </a:endParaRPr>
-          </a:p>
-        </p:txBody>
-      </p:sp>
       <p:pic>
         <p:nvPicPr>
-          <p:cNvPr id="5" name="Graphic 4" descr="Boardroom">
+          <p:cNvPr id="5" name="Graphic 4" descr="Boardroom meeting">
             <a:extLst>
               <a:ext uri="{FF2B5EF4-FFF2-40B4-BE49-F238E27FC236}">
                 <a16:creationId xmlns:a16="http://schemas.microsoft.com/office/drawing/2014/main" id="{842E652E-4F2B-4777-8909-B989B91CB869}"/>
@@ -19959,6 +19933,112 @@
           </a:prstGeom>
         </p:spPr>
       </p:pic>
+      <p:sp>
+        <p:nvSpPr>
+          <p:cNvPr id="3" name="Content Placeholder 2"/>
+          <p:cNvSpPr>
+            <a:spLocks noGrp="1"/>
+          </p:cNvSpPr>
+          <p:nvPr>
+            <p:ph type="body" sz="quarter" idx="10"/>
+          </p:nvPr>
+        </p:nvSpPr>
+        <p:spPr>
+          <a:xfrm>
+            <a:off x="269239" y="1189177"/>
+            <a:ext cx="8675469" cy="5192168"/>
+          </a:xfrm>
+        </p:spPr>
+        <p:txBody>
+          <a:bodyPr>
+            <a:noAutofit/>
+          </a:bodyPr>
+          <a:lstStyle/>
+          <a:p>
+            <a:r>
+              <a:rPr lang="en-US" sz="2400" dirty="0"/>
+              <a:t>Trey Research Inc. delivers innovative solutions for manufacturers.</a:t>
+            </a:r>
+          </a:p>
+          <a:p>
+            <a:r>
+              <a:rPr lang="en-US" sz="2400" dirty="0"/>
+              <a:t>They specialize in identifying and solving problems for manufacturers that can run the range from automating away mundane but time-intensive processes to delivering cutting edge approaches that provide new opportunities for their manufacturing clients. </a:t>
+            </a:r>
+          </a:p>
+          <a:p>
+            <a:r>
+              <a:rPr lang="en-US" sz="2400" dirty="0"/>
+              <a:t>Trey Research has decades specializing in data science and application development that until now were separate units. </a:t>
+            </a:r>
+          </a:p>
+          <a:p>
+            <a:r>
+              <a:rPr lang="en-US" sz="2400" dirty="0"/>
+              <a:t>They have seen the value created by the ad-hoc synergies between data science and app development, but they would like to unlock the greater, long term value as they formalize their approach by combining the two units into one and follow one standardized process for operationalizing their innovations.</a:t>
+            </a:r>
+          </a:p>
+          <a:p>
+            <a:endParaRPr lang="en-US" sz="2400" dirty="0"/>
+          </a:p>
+          <a:p>
+            <a:pPr marL="0" indent="0">
+              <a:spcAft>
+                <a:spcPts val="882"/>
+              </a:spcAft>
+              <a:buNone/>
+            </a:pPr>
+            <a:endParaRPr lang="en-US" sz="2400" dirty="0">
+              <a:solidFill>
+                <a:schemeClr val="tx1"/>
+              </a:solidFill>
+            </a:endParaRPr>
+          </a:p>
+        </p:txBody>
+      </p:sp>
+      <p:sp>
+        <p:nvSpPr>
+          <p:cNvPr id="2" name="Title 1"/>
+          <p:cNvSpPr>
+            <a:spLocks noGrp="1"/>
+          </p:cNvSpPr>
+          <p:nvPr>
+            <p:ph type="title"/>
+          </p:nvPr>
+        </p:nvSpPr>
+        <p:spPr/>
+        <p:txBody>
+          <a:bodyPr>
+            <a:normAutofit fontScale="90000"/>
+          </a:bodyPr>
+          <a:lstStyle/>
+          <a:p>
+            <a:r>
+              <a:rPr lang="en-US" sz="4900" dirty="0">
+                <a:solidFill>
+                  <a:schemeClr val="tx1"/>
+                </a:solidFill>
+                <a:cs typeface="Segoe UI" panose="020B0502040204020203" pitchFamily="34" charset="0"/>
+              </a:rPr>
+              <a:t>Customer situation - introduction</a:t>
+            </a:r>
+            <a:br>
+              <a:rPr lang="en-US" dirty="0">
+                <a:solidFill>
+                  <a:schemeClr val="tx1"/>
+                </a:solidFill>
+                <a:latin typeface="Segoe UI" panose="020B0502040204020203" pitchFamily="34" charset="0"/>
+              </a:rPr>
+            </a:br>
+            <a:endParaRPr lang="en-US" sz="3236" dirty="0">
+              <a:solidFill>
+                <a:schemeClr val="tx1"/>
+              </a:solidFill>
+              <a:latin typeface="Segoe UI" panose="020B0502040204020203" pitchFamily="34" charset="0"/>
+            </a:endParaRPr>
+          </a:p>
+        </p:txBody>
+      </p:sp>
     </p:spTree>
     <p:extLst>
       <p:ext uri="{BB962C8B-B14F-4D97-AF65-F5344CB8AC3E}">
@@ -19997,49 +20077,105 @@
           <a:chExt cx="0" cy="0"/>
         </a:xfrm>
       </p:grpSpPr>
-      <p:sp>
-        <p:nvSpPr>
-          <p:cNvPr id="2" name="Title 1"/>
-          <p:cNvSpPr>
-            <a:spLocks noGrp="1"/>
-          </p:cNvSpPr>
-          <p:nvPr>
-            <p:ph type="title"/>
-          </p:nvPr>
-        </p:nvSpPr>
-        <p:spPr/>
-        <p:txBody>
-          <a:bodyPr>
-            <a:normAutofit fontScale="90000"/>
-          </a:bodyPr>
-          <a:lstStyle/>
-          <a:p>
-            <a:r>
-              <a:rPr lang="en-US" sz="4900" dirty="0">
-                <a:solidFill>
-                  <a:schemeClr val="tx1"/>
-                </a:solidFill>
-                <a:cs typeface="Segoe UI" panose="020B0502040204020203" pitchFamily="34" charset="0"/>
-              </a:rPr>
-              <a:t>Customer situation</a:t>
-            </a:r>
-            <a:br>
-              <a:rPr lang="en-US" dirty="0">
-                <a:solidFill>
-                  <a:schemeClr val="tx1"/>
-                </a:solidFill>
-                <a:latin typeface="Segoe UI" panose="020B0502040204020203" pitchFamily="34" charset="0"/>
-              </a:rPr>
-            </a:br>
-            <a:endParaRPr lang="en-US" sz="3236" dirty="0">
-              <a:solidFill>
-                <a:schemeClr val="tx1"/>
-              </a:solidFill>
-              <a:latin typeface="Segoe UI" panose="020B0502040204020203" pitchFamily="34" charset="0"/>
-            </a:endParaRPr>
-          </a:p>
-        </p:txBody>
-      </p:sp>
+      <p:grpSp>
+        <p:nvGrpSpPr>
+          <p:cNvPr id="4" name="Group 3" descr="Customer situation details investigation">
+            <a:extLst>
+              <a:ext uri="{FF2B5EF4-FFF2-40B4-BE49-F238E27FC236}">
+                <a16:creationId xmlns:a16="http://schemas.microsoft.com/office/drawing/2014/main" id="{443017D5-7E5D-4CB8-984D-E1DF3783B104}"/>
+              </a:ext>
+            </a:extLst>
+          </p:cNvPr>
+          <p:cNvGrpSpPr/>
+          <p:nvPr/>
+        </p:nvGrpSpPr>
+        <p:grpSpPr>
+          <a:xfrm>
+            <a:off x="-92780" y="1212046"/>
+            <a:ext cx="2573215" cy="2847544"/>
+            <a:chOff x="-92780" y="1212046"/>
+            <a:chExt cx="2573215" cy="2847544"/>
+          </a:xfrm>
+        </p:grpSpPr>
+        <p:pic>
+          <p:nvPicPr>
+            <p:cNvPr id="7" name="Graphic 6" descr="Checklist">
+              <a:extLst>
+                <a:ext uri="{FF2B5EF4-FFF2-40B4-BE49-F238E27FC236}">
+                  <a16:creationId xmlns:a16="http://schemas.microsoft.com/office/drawing/2014/main" id="{078AD01E-991E-4EFA-A8CF-20A08381B6D6}"/>
+                </a:ext>
+              </a:extLst>
+            </p:cNvPr>
+            <p:cNvPicPr>
+              <a:picLocks noChangeAspect="1"/>
+            </p:cNvPicPr>
+            <p:nvPr/>
+          </p:nvPicPr>
+          <p:blipFill>
+            <a:blip r:embed="rId3">
+              <a:extLst>
+                <a:ext uri="{28A0092B-C50C-407E-A947-70E740481C1C}">
+                  <a14:useLocalDpi xmlns:a14="http://schemas.microsoft.com/office/drawing/2010/main" val="0"/>
+                </a:ext>
+                <a:ext uri="{96DAC541-7B7A-43D3-8B79-37D633B846F1}">
+                  <asvg:svgBlip xmlns:asvg="http://schemas.microsoft.com/office/drawing/2016/SVG/main" r:embed="rId4"/>
+                </a:ext>
+              </a:extLst>
+            </a:blip>
+            <a:stretch>
+              <a:fillRect/>
+            </a:stretch>
+          </p:blipFill>
+          <p:spPr>
+            <a:xfrm>
+              <a:off x="-92780" y="1212046"/>
+              <a:ext cx="2573215" cy="2573215"/>
+            </a:xfrm>
+            <a:prstGeom prst="rect">
+              <a:avLst/>
+            </a:prstGeom>
+          </p:spPr>
+        </p:pic>
+        <p:pic>
+          <p:nvPicPr>
+            <p:cNvPr id="5" name="Graphic 4" descr="Magnifying glass">
+              <a:extLst>
+                <a:ext uri="{FF2B5EF4-FFF2-40B4-BE49-F238E27FC236}">
+                  <a16:creationId xmlns:a16="http://schemas.microsoft.com/office/drawing/2014/main" id="{ECD3B699-AAE7-4E31-8FEE-57B8AFA378C1}"/>
+                </a:ext>
+              </a:extLst>
+            </p:cNvPr>
+            <p:cNvPicPr>
+              <a:picLocks noChangeAspect="1"/>
+            </p:cNvPicPr>
+            <p:nvPr/>
+          </p:nvPicPr>
+          <p:blipFill>
+            <a:blip r:embed="rId5">
+              <a:extLst>
+                <a:ext uri="{28A0092B-C50C-407E-A947-70E740481C1C}">
+                  <a14:useLocalDpi xmlns:a14="http://schemas.microsoft.com/office/drawing/2010/main" val="0"/>
+                </a:ext>
+                <a:ext uri="{96DAC541-7B7A-43D3-8B79-37D633B846F1}">
+                  <asvg:svgBlip xmlns:asvg="http://schemas.microsoft.com/office/drawing/2016/SVG/main" r:embed="rId6"/>
+                </a:ext>
+              </a:extLst>
+            </a:blip>
+            <a:stretch>
+              <a:fillRect/>
+            </a:stretch>
+          </p:blipFill>
+          <p:spPr>
+            <a:xfrm>
+              <a:off x="914400" y="2596662"/>
+              <a:ext cx="1462928" cy="1462928"/>
+            </a:xfrm>
+            <a:prstGeom prst="rect">
+              <a:avLst/>
+            </a:prstGeom>
+          </p:spPr>
+        </p:pic>
+      </p:grpSp>
       <p:sp>
         <p:nvSpPr>
           <p:cNvPr id="3" name="Content Placeholder 2"/>
@@ -20100,84 +20236,54 @@
           </a:p>
         </p:txBody>
       </p:sp>
-      <p:pic>
-        <p:nvPicPr>
-          <p:cNvPr id="7" name="Graphic 6" descr="Checklist">
-            <a:extLst>
-              <a:ext uri="{FF2B5EF4-FFF2-40B4-BE49-F238E27FC236}">
-                <a16:creationId xmlns:a16="http://schemas.microsoft.com/office/drawing/2014/main" id="{078AD01E-991E-4EFA-A8CF-20A08381B6D6}"/>
-              </a:ext>
-            </a:extLst>
-          </p:cNvPr>
-          <p:cNvPicPr>
-            <a:picLocks noChangeAspect="1"/>
-          </p:cNvPicPr>
-          <p:nvPr/>
-        </p:nvPicPr>
-        <p:blipFill>
-          <a:blip r:embed="rId3">
-            <a:extLst>
-              <a:ext uri="{28A0092B-C50C-407E-A947-70E740481C1C}">
-                <a14:useLocalDpi xmlns:a14="http://schemas.microsoft.com/office/drawing/2010/main" val="0"/>
-              </a:ext>
-              <a:ext uri="{96DAC541-7B7A-43D3-8B79-37D633B846F1}">
-                <asvg:svgBlip xmlns:asvg="http://schemas.microsoft.com/office/drawing/2016/SVG/main" r:embed="rId4"/>
-              </a:ext>
-            </a:extLst>
-          </a:blip>
-          <a:stretch>
-            <a:fillRect/>
-          </a:stretch>
-        </p:blipFill>
+      <p:sp>
+        <p:nvSpPr>
+          <p:cNvPr id="2" name="Title 1"/>
+          <p:cNvSpPr>
+            <a:spLocks noGrp="1"/>
+          </p:cNvSpPr>
+          <p:nvPr>
+            <p:ph type="title"/>
+          </p:nvPr>
+        </p:nvSpPr>
         <p:spPr>
           <a:xfrm>
-            <a:off x="-92780" y="1212046"/>
-            <a:ext cx="2573215" cy="2573215"/>
+            <a:off x="269240" y="289511"/>
+            <a:ext cx="11655840" cy="899665"/>
           </a:xfrm>
-          <a:prstGeom prst="rect">
-            <a:avLst/>
-          </a:prstGeom>
         </p:spPr>
-      </p:pic>
-      <p:pic>
-        <p:nvPicPr>
-          <p:cNvPr id="5" name="Graphic 4" descr="Magnifying glass">
-            <a:extLst>
-              <a:ext uri="{FF2B5EF4-FFF2-40B4-BE49-F238E27FC236}">
-                <a16:creationId xmlns:a16="http://schemas.microsoft.com/office/drawing/2014/main" id="{ECD3B699-AAE7-4E31-8FEE-57B8AFA378C1}"/>
-              </a:ext>
-            </a:extLst>
-          </p:cNvPr>
-          <p:cNvPicPr>
-            <a:picLocks noChangeAspect="1"/>
-          </p:cNvPicPr>
-          <p:nvPr/>
-        </p:nvPicPr>
-        <p:blipFill>
-          <a:blip r:embed="rId5">
-            <a:extLst>
-              <a:ext uri="{28A0092B-C50C-407E-A947-70E740481C1C}">
-                <a14:useLocalDpi xmlns:a14="http://schemas.microsoft.com/office/drawing/2010/main" val="0"/>
-              </a:ext>
-              <a:ext uri="{96DAC541-7B7A-43D3-8B79-37D633B846F1}">
-                <asvg:svgBlip xmlns:asvg="http://schemas.microsoft.com/office/drawing/2016/SVG/main" r:embed="rId6"/>
-              </a:ext>
-            </a:extLst>
-          </a:blip>
-          <a:stretch>
-            <a:fillRect/>
-          </a:stretch>
-        </p:blipFill>
-        <p:spPr>
-          <a:xfrm>
-            <a:off x="914400" y="2596662"/>
-            <a:ext cx="1462928" cy="1462928"/>
-          </a:xfrm>
-          <a:prstGeom prst="rect">
-            <a:avLst/>
-          </a:prstGeom>
-        </p:spPr>
-      </p:pic>
+        <p:txBody>
+          <a:bodyPr>
+            <a:normAutofit fontScale="90000"/>
+          </a:bodyPr>
+          <a:lstStyle/>
+          <a:p>
+            <a:r>
+              <a:rPr lang="en-US" sz="4900" dirty="0">
+                <a:solidFill>
+                  <a:schemeClr val="tx1"/>
+                </a:solidFill>
+                <a:cs typeface="Segoe UI" panose="020B0502040204020203" pitchFamily="34" charset="0"/>
+              </a:rPr>
+              <a:t>Customer situation - analysis</a:t>
+            </a:r>
+            <a:br>
+              <a:rPr lang="en-US" dirty="0">
+                <a:solidFill>
+                  <a:schemeClr val="tx1"/>
+                </a:solidFill>
+                <a:latin typeface="Segoe UI" panose="020B0502040204020203" pitchFamily="34" charset="0"/>
+              </a:rPr>
+            </a:br>
+            <a:endParaRPr lang="en-US" sz="3236" dirty="0">
+              <a:solidFill>
+                <a:schemeClr val="tx1"/>
+              </a:solidFill>
+              <a:latin typeface="Segoe UI" panose="020B0502040204020203" pitchFamily="34" charset="0"/>
+            </a:endParaRPr>
+          </a:p>
+        </p:txBody>
+      </p:sp>
     </p:spTree>
     <p:extLst>
       <p:ext uri="{BB962C8B-B14F-4D97-AF65-F5344CB8AC3E}">
@@ -20286,7 +20392,7 @@
                 </a:solidFill>
                 <a:cs typeface="Segoe UI" panose="020B0502040204020203" pitchFamily="34" charset="0"/>
               </a:rPr>
-              <a:t>Customer situation</a:t>
+              <a:t>Customer situation - expectations</a:t>
             </a:r>
             <a:br>
               <a:rPr lang="en-US" dirty="0">
@@ -20657,49 +20763,6 @@
           <a:chExt cx="0" cy="0"/>
         </a:xfrm>
       </p:grpSpPr>
-      <p:sp>
-        <p:nvSpPr>
-          <p:cNvPr id="2" name="Title 1"/>
-          <p:cNvSpPr>
-            <a:spLocks noGrp="1"/>
-          </p:cNvSpPr>
-          <p:nvPr>
-            <p:ph type="title"/>
-          </p:nvPr>
-        </p:nvSpPr>
-        <p:spPr/>
-        <p:txBody>
-          <a:bodyPr>
-            <a:normAutofit fontScale="90000"/>
-          </a:bodyPr>
-          <a:lstStyle/>
-          <a:p>
-            <a:r>
-              <a:rPr lang="en-US" sz="4900" dirty="0">
-                <a:solidFill>
-                  <a:schemeClr val="tx1"/>
-                </a:solidFill>
-                <a:cs typeface="Segoe UI" panose="020B0502040204020203" pitchFamily="34" charset="0"/>
-              </a:rPr>
-              <a:t>Common scenarios</a:t>
-            </a:r>
-            <a:br>
-              <a:rPr lang="en-US" dirty="0">
-                <a:solidFill>
-                  <a:schemeClr val="tx1"/>
-                </a:solidFill>
-                <a:latin typeface="Segoe UI" panose="020B0502040204020203" pitchFamily="34" charset="0"/>
-              </a:rPr>
-            </a:br>
-            <a:endParaRPr lang="en-US" sz="3236" dirty="0">
-              <a:solidFill>
-                <a:schemeClr val="tx1"/>
-              </a:solidFill>
-              <a:latin typeface="Segoe UI" panose="020B0502040204020203" pitchFamily="34" charset="0"/>
-            </a:endParaRPr>
-          </a:p>
-        </p:txBody>
-      </p:sp>
       <p:pic>
         <p:nvPicPr>
           <p:cNvPr id="4" name="Picture 3" descr="A common example of a Machine Learning pipeline">
@@ -20736,6 +20799,49 @@
           </a:prstGeom>
         </p:spPr>
       </p:pic>
+      <p:sp>
+        <p:nvSpPr>
+          <p:cNvPr id="2" name="Title 1"/>
+          <p:cNvSpPr>
+            <a:spLocks noGrp="1"/>
+          </p:cNvSpPr>
+          <p:nvPr>
+            <p:ph type="title"/>
+          </p:nvPr>
+        </p:nvSpPr>
+        <p:spPr/>
+        <p:txBody>
+          <a:bodyPr>
+            <a:normAutofit fontScale="90000"/>
+          </a:bodyPr>
+          <a:lstStyle/>
+          <a:p>
+            <a:r>
+              <a:rPr lang="en-US" sz="4900" dirty="0">
+                <a:solidFill>
+                  <a:schemeClr val="tx1"/>
+                </a:solidFill>
+                <a:cs typeface="Segoe UI" panose="020B0502040204020203" pitchFamily="34" charset="0"/>
+              </a:rPr>
+              <a:t>Common scenarios</a:t>
+            </a:r>
+            <a:br>
+              <a:rPr lang="en-US" dirty="0">
+                <a:solidFill>
+                  <a:schemeClr val="tx1"/>
+                </a:solidFill>
+                <a:latin typeface="Segoe UI" panose="020B0502040204020203" pitchFamily="34" charset="0"/>
+              </a:rPr>
+            </a:br>
+            <a:endParaRPr lang="en-US" sz="3236" dirty="0">
+              <a:solidFill>
+                <a:schemeClr val="tx1"/>
+              </a:solidFill>
+              <a:latin typeface="Segoe UI" panose="020B0502040204020203" pitchFamily="34" charset="0"/>
+            </a:endParaRPr>
+          </a:p>
+        </p:txBody>
+      </p:sp>
     </p:spTree>
     <p:extLst>
       <p:ext uri="{BB962C8B-B14F-4D97-AF65-F5344CB8AC3E}">
@@ -21866,16 +21972,16 @@
 <ds:datastoreItem xmlns:ds="http://schemas.openxmlformats.org/officeDocument/2006/customXml" ds:itemID="{BAF7D529-36AB-45DA-B239-2F912F2D1610}">
   <ds:schemaRefs>
     <ds:schemaRef ds:uri="http://schemas.microsoft.com/office/2006/documentManagement/types"/>
+    <ds:schemaRef ds:uri="http://purl.org/dc/dcmitype/"/>
+    <ds:schemaRef ds:uri="http://www.w3.org/XML/1998/namespace"/>
     <ds:schemaRef ds:uri="http://purl.org/dc/elements/1.1/"/>
-    <ds:schemaRef ds:uri="http://www.w3.org/XML/1998/namespace"/>
+    <ds:schemaRef ds:uri="http://schemas.microsoft.com/sharepoint/v3"/>
+    <ds:schemaRef ds:uri="2023ac63-7b75-4916-a9ee-591457758eee"/>
+    <ds:schemaRef ds:uri="http://schemas.microsoft.com/office/infopath/2007/PartnerControls"/>
+    <ds:schemaRef ds:uri="http://schemas.microsoft.com/office/2006/metadata/properties"/>
+    <ds:schemaRef ds:uri="http://schemas.openxmlformats.org/package/2006/metadata/core-properties"/>
+    <ds:schemaRef ds:uri="d9c797ad-d7c3-4982-82b7-81352a75e4a5"/>
     <ds:schemaRef ds:uri="http://purl.org/dc/terms/"/>
-    <ds:schemaRef ds:uri="d9c797ad-d7c3-4982-82b7-81352a75e4a5"/>
-    <ds:schemaRef ds:uri="http://schemas.openxmlformats.org/package/2006/metadata/core-properties"/>
-    <ds:schemaRef ds:uri="http://purl.org/dc/dcmitype/"/>
-    <ds:schemaRef ds:uri="http://schemas.microsoft.com/office/infopath/2007/PartnerControls"/>
-    <ds:schemaRef ds:uri="2023ac63-7b75-4916-a9ee-591457758eee"/>
-    <ds:schemaRef ds:uri="http://schemas.microsoft.com/sharepoint/v3"/>
-    <ds:schemaRef ds:uri="http://schemas.microsoft.com/office/2006/metadata/properties"/>
   </ds:schemaRefs>
 </ds:datastoreItem>
 </file>

</xml_diff>

<commit_message>
Fixed a few grammar errors. Updated reading order in PPTX.
</commit_message>
<xml_diff>
--- a/Whiteboard design session/WDS trainer presentation - MLOps.pptx
+++ b/Whiteboard design session/WDS trainer presentation - MLOps.pptx
@@ -235,7 +235,7 @@
           <a:p>
             <a:fld id="{52A13B17-C506-4D51-BB37-16B365906619}" type="datetimeFigureOut">
               <a:rPr lang="en-US" smtClean="0"/>
-              <a:t>12/2/2019</a:t>
+              <a:t>12/24/2019</a:t>
             </a:fld>
             <a:endParaRPr lang="en-US" dirty="0"/>
           </a:p>
@@ -15282,6 +15282,41 @@
           <a:chExt cx="0" cy="0"/>
         </a:xfrm>
       </p:grpSpPr>
+      <p:sp>
+        <p:nvSpPr>
+          <p:cNvPr id="2" name="Title 1"/>
+          <p:cNvSpPr>
+            <a:spLocks noGrp="1"/>
+          </p:cNvSpPr>
+          <p:nvPr>
+            <p:ph type="title"/>
+          </p:nvPr>
+        </p:nvSpPr>
+        <p:spPr>
+          <a:xfrm>
+            <a:off x="291012" y="289511"/>
+            <a:ext cx="11655840" cy="899665"/>
+          </a:xfrm>
+        </p:spPr>
+        <p:txBody>
+          <a:bodyPr>
+            <a:normAutofit/>
+          </a:bodyPr>
+          <a:lstStyle/>
+          <a:p>
+            <a:r>
+              <a:rPr lang="en-US" sz="4400" dirty="0">
+                <a:solidFill>
+                  <a:schemeClr val="tx1"/>
+                </a:solidFill>
+                <a:latin typeface="Segoe UI Light" panose="020B0502040204020203" pitchFamily="34" charset="0"/>
+                <a:cs typeface="Segoe UI Light" panose="020B0502040204020203" pitchFamily="34" charset="0"/>
+              </a:rPr>
+              <a:t>Step 2: Design the solution</a:t>
+            </a:r>
+          </a:p>
+        </p:txBody>
+      </p:sp>
       <p:graphicFrame>
         <p:nvGraphicFramePr>
           <p:cNvPr id="4" name="Table 3">
@@ -15297,14 +15332,14 @@
           <p:nvPr>
             <p:extLst>
               <p:ext uri="{D42A27DB-BD31-4B8C-83A1-F6EECF244321}">
-                <p14:modId xmlns:p14="http://schemas.microsoft.com/office/powerpoint/2010/main" val="2701882102"/>
+                <p14:modId xmlns:p14="http://schemas.microsoft.com/office/powerpoint/2010/main" val="1920412818"/>
               </p:ext>
             </p:extLst>
           </p:nvPr>
         </p:nvGraphicFramePr>
         <p:xfrm>
-          <a:off x="3095545" y="3791921"/>
-          <a:ext cx="8040154" cy="2420452"/>
+          <a:off x="3160859" y="2800627"/>
+          <a:ext cx="8040154" cy="3767862"/>
         </p:xfrm>
         <a:graphic>
           <a:graphicData uri="http://schemas.openxmlformats.org/drawingml/2006/table">
@@ -15335,14 +15370,14 @@
                     <a:lstStyle/>
                     <a:p>
                       <a:r>
-                        <a:rPr lang="en-US" sz="1300" b="1" i="1" dirty="0">
+                        <a:rPr lang="en-US" sz="1800" b="1" i="1" dirty="0">
                           <a:latin typeface="Segoe UI" panose="020B0502040204020203" pitchFamily="34" charset="0"/>
                           <a:cs typeface="Segoe UI" panose="020B0502040204020203" pitchFamily="34" charset="0"/>
                         </a:rPr>
                         <a:t>Business</a:t>
                       </a:r>
                       <a:r>
-                        <a:rPr lang="en-US" sz="1300" b="1" i="1" kern="1200" dirty="0">
+                        <a:rPr lang="en-US" sz="1800" b="1" i="1" kern="1200" dirty="0">
                           <a:solidFill>
                             <a:schemeClr val="dk1"/>
                           </a:solidFill>
@@ -15355,19 +15390,19 @@
                     </a:p>
                     <a:p>
                       <a:r>
-                        <a:rPr lang="en-US" sz="1300" b="0" i="0" dirty="0">
+                        <a:rPr lang="en-US" sz="1800" b="0" i="0" dirty="0">
                           <a:latin typeface="Segoe UI" panose="020B0502040204020203" pitchFamily="34" charset="0"/>
                           <a:cs typeface="Segoe UI" panose="020B0502040204020203" pitchFamily="34" charset="0"/>
                         </a:rPr>
                         <a:t>(10 minutes)</a:t>
                       </a:r>
                       <a:br>
-                        <a:rPr lang="en-US" sz="1300" b="0" i="0" dirty="0">
+                        <a:rPr lang="en-US" sz="1800" b="0" i="0" dirty="0">
                           <a:latin typeface="Segoe UI" panose="020B0502040204020203" pitchFamily="34" charset="0"/>
                           <a:cs typeface="Segoe UI" panose="020B0502040204020203" pitchFamily="34" charset="0"/>
                         </a:rPr>
                       </a:br>
-                      <a:endParaRPr lang="en-US" sz="1300" b="0" i="0" dirty="0">
+                      <a:endParaRPr lang="en-US" sz="1800" b="0" i="0" dirty="0">
                         <a:latin typeface="Segoe UI" panose="020B0502040204020203" pitchFamily="34" charset="0"/>
                         <a:cs typeface="Segoe UI" panose="020B0502040204020203" pitchFamily="34" charset="0"/>
                       </a:endParaRPr>
@@ -15398,7 +15433,7 @@
                         <a:defRPr/>
                       </a:pPr>
                       <a:r>
-                        <a:rPr lang="en-US" sz="1300" b="0" dirty="0">
+                        <a:rPr lang="en-US" sz="1800" b="0" dirty="0">
                           <a:solidFill>
                             <a:schemeClr val="bg1"/>
                           </a:solidFill>
@@ -15409,7 +15444,7 @@
                       </a:r>
                     </a:p>
                     <a:p>
-                      <a:endParaRPr lang="en-US" sz="1300" b="0" dirty="0">
+                      <a:endParaRPr lang="en-US" sz="1800" b="0" dirty="0">
                         <a:latin typeface="Segoe UI" panose="020B0502040204020203" pitchFamily="34" charset="0"/>
                         <a:cs typeface="Segoe UI" panose="020B0502040204020203" pitchFamily="34" charset="0"/>
                       </a:endParaRPr>
@@ -15430,7 +15465,7 @@
                     <a:lstStyle/>
                     <a:p>
                       <a:r>
-                        <a:rPr lang="en-US" sz="1300" b="1" i="1" dirty="0">
+                        <a:rPr lang="en-US" sz="1800" b="1" i="1" dirty="0">
                           <a:latin typeface="Segoe UI" panose="020B0502040204020203" pitchFamily="34" charset="0"/>
                           <a:cs typeface="Segoe UI" panose="020B0502040204020203" pitchFamily="34" charset="0"/>
                         </a:rPr>
@@ -15440,7 +15475,7 @@
                     <a:p>
                       <a:pPr marL="0" algn="l" defTabSz="932742" rtl="0" eaLnBrk="1" latinLnBrk="0" hangingPunct="1"/>
                       <a:r>
-                        <a:rPr lang="en-US" sz="1300" b="0" i="0" kern="1200" dirty="0">
+                        <a:rPr lang="en-US" sz="1800" b="0" i="0" kern="1200" dirty="0">
                           <a:solidFill>
                             <a:schemeClr val="dk1"/>
                           </a:solidFill>
@@ -15451,7 +15486,7 @@
                         <a:t>(35 minutes)</a:t>
                       </a:r>
                       <a:br>
-                        <a:rPr lang="en-US" sz="1300" b="0" i="0" kern="1200" dirty="0">
+                        <a:rPr lang="en-US" sz="1800" b="0" i="0" kern="1200" dirty="0">
                           <a:solidFill>
                             <a:schemeClr val="dk1"/>
                           </a:solidFill>
@@ -15460,7 +15495,7 @@
                           <a:cs typeface="Segoe UI" panose="020B0502040204020203" pitchFamily="34" charset="0"/>
                         </a:rPr>
                       </a:br>
-                      <a:endParaRPr lang="en-US" sz="1300" b="0" i="0" kern="1200" dirty="0">
+                      <a:endParaRPr lang="en-US" sz="1800" b="0" i="0" kern="1200" dirty="0">
                         <a:solidFill>
                           <a:schemeClr val="dk1"/>
                         </a:solidFill>
@@ -15495,7 +15530,7 @@
                         <a:defRPr/>
                       </a:pPr>
                       <a:r>
-                        <a:rPr lang="en-US" sz="1300" kern="1200" baseline="0" dirty="0">
+                        <a:rPr lang="en-US" sz="1800" kern="1200" baseline="0" dirty="0">
                           <a:solidFill>
                             <a:schemeClr val="bg1"/>
                           </a:solidFill>
@@ -15507,7 +15542,7 @@
                       </a:r>
                     </a:p>
                     <a:p>
-                      <a:endParaRPr lang="en-US" sz="1300" dirty="0">
+                      <a:endParaRPr lang="en-US" sz="1800" dirty="0">
                         <a:latin typeface="Segoe UI" panose="020B0502040204020203" pitchFamily="34" charset="0"/>
                         <a:cs typeface="Segoe UI" panose="020B0502040204020203" pitchFamily="34" charset="0"/>
                       </a:endParaRPr>
@@ -15528,7 +15563,7 @@
                     <a:lstStyle/>
                     <a:p>
                       <a:r>
-                        <a:rPr lang="en-US" sz="1300" b="1" i="1" dirty="0">
+                        <a:rPr lang="en-US" sz="1800" b="1" i="1" dirty="0">
                           <a:latin typeface="Segoe UI" panose="020B0502040204020203" pitchFamily="34" charset="0"/>
                           <a:cs typeface="Segoe UI" panose="020B0502040204020203" pitchFamily="34" charset="0"/>
                         </a:rPr>
@@ -15554,7 +15589,7 @@
                         <a:defRPr/>
                       </a:pPr>
                       <a:r>
-                        <a:rPr lang="en-US" sz="1300" b="0" i="0" kern="1200" dirty="0">
+                        <a:rPr lang="en-US" sz="1800" b="0" i="0" kern="1200" dirty="0">
                           <a:solidFill>
                             <a:schemeClr val="dk1"/>
                           </a:solidFill>
@@ -15566,7 +15601,7 @@
                       </a:r>
                     </a:p>
                     <a:p>
-                      <a:endParaRPr lang="en-US" sz="1300" b="1" i="1" dirty="0">
+                      <a:endParaRPr lang="en-US" sz="1800" b="1" i="1" dirty="0">
                         <a:latin typeface="Segoe UI" panose="020B0502040204020203" pitchFamily="34" charset="0"/>
                         <a:cs typeface="Segoe UI" panose="020B0502040204020203" pitchFamily="34" charset="0"/>
                       </a:endParaRPr>
@@ -15584,7 +15619,7 @@
                         <a:buChar char="•"/>
                       </a:pPr>
                       <a:r>
-                        <a:rPr lang="en-US" sz="1300" dirty="0">
+                        <a:rPr lang="en-US" sz="1800" dirty="0">
                           <a:latin typeface="Segoe UI" panose="020B0502040204020203" pitchFamily="34" charset="0"/>
                           <a:cs typeface="Segoe UI" panose="020B0502040204020203" pitchFamily="34" charset="0"/>
                         </a:rPr>
@@ -15597,7 +15632,7 @@
                         <a:buChar char="•"/>
                       </a:pPr>
                       <a:r>
-                        <a:rPr lang="en-US" sz="1300" dirty="0">
+                        <a:rPr lang="en-US" sz="1800" dirty="0">
                           <a:latin typeface="Segoe UI" panose="020B0502040204020203" pitchFamily="34" charset="0"/>
                           <a:cs typeface="Segoe UI" panose="020B0502040204020203" pitchFamily="34" charset="0"/>
                         </a:rPr>
@@ -15610,7 +15645,7 @@
                         <a:buChar char="•"/>
                       </a:pPr>
                       <a:r>
-                        <a:rPr lang="en-US" sz="1300" dirty="0">
+                        <a:rPr lang="en-US" sz="1800" dirty="0">
                           <a:latin typeface="Segoe UI" panose="020B0502040204020203" pitchFamily="34" charset="0"/>
                           <a:cs typeface="Segoe UI" panose="020B0502040204020203" pitchFamily="34" charset="0"/>
                         </a:rPr>
@@ -15623,19 +15658,19 @@
                         <a:buChar char="•"/>
                       </a:pPr>
                       <a:r>
-                        <a:rPr lang="en-US" sz="1300" dirty="0">
+                        <a:rPr lang="en-US" sz="1800" dirty="0">
                           <a:latin typeface="Segoe UI" panose="020B0502040204020203" pitchFamily="34" charset="0"/>
                           <a:cs typeface="Segoe UI" panose="020B0502040204020203" pitchFamily="34" charset="0"/>
                         </a:rPr>
                         <a:t>Prepare for a 15-minute presentation to the customer</a:t>
                       </a:r>
                       <a:br>
-                        <a:rPr lang="en-US" sz="1300" dirty="0">
+                        <a:rPr lang="en-US" sz="1800" dirty="0">
                           <a:latin typeface="Segoe UI" panose="020B0502040204020203" pitchFamily="34" charset="0"/>
                           <a:cs typeface="Segoe UI" panose="020B0502040204020203" pitchFamily="34" charset="0"/>
                         </a:rPr>
                       </a:br>
-                      <a:endParaRPr lang="en-US" sz="1300" dirty="0">
+                      <a:endParaRPr lang="en-US" sz="1800" dirty="0">
                         <a:latin typeface="Segoe UI" panose="020B0502040204020203" pitchFamily="34" charset="0"/>
                         <a:cs typeface="Segoe UI" panose="020B0502040204020203" pitchFamily="34" charset="0"/>
                       </a:endParaRPr>
@@ -15667,7 +15702,7 @@
         </p:nvSpPr>
         <p:spPr>
           <a:xfrm>
-            <a:off x="362057" y="1741246"/>
+            <a:off x="291012" y="1189176"/>
             <a:ext cx="10652686" cy="2930033"/>
           </a:xfrm>
           <a:prstGeom prst="rect">
@@ -15755,41 +15790,6 @@
                 <a:cs typeface="Segoe UI Semilight" panose="020B0402040204020203" pitchFamily="34" charset="0"/>
               </a:rPr>
               <a:t>60 minutes</a:t>
-            </a:r>
-          </a:p>
-        </p:txBody>
-      </p:sp>
-      <p:sp>
-        <p:nvSpPr>
-          <p:cNvPr id="2" name="Title 1"/>
-          <p:cNvSpPr>
-            <a:spLocks noGrp="1"/>
-          </p:cNvSpPr>
-          <p:nvPr>
-            <p:ph type="title"/>
-          </p:nvPr>
-        </p:nvSpPr>
-        <p:spPr>
-          <a:xfrm>
-            <a:off x="291012" y="289511"/>
-            <a:ext cx="11655840" cy="899665"/>
-          </a:xfrm>
-        </p:spPr>
-        <p:txBody>
-          <a:bodyPr>
-            <a:normAutofit/>
-          </a:bodyPr>
-          <a:lstStyle/>
-          <a:p>
-            <a:r>
-              <a:rPr lang="en-US" sz="4400" dirty="0">
-                <a:solidFill>
-                  <a:schemeClr val="tx1"/>
-                </a:solidFill>
-                <a:latin typeface="Segoe UI Light" panose="020B0502040204020203" pitchFamily="34" charset="0"/>
-                <a:cs typeface="Segoe UI Light" panose="020B0502040204020203" pitchFamily="34" charset="0"/>
-              </a:rPr>
-              <a:t>Step 2: Design the solution</a:t>
             </a:r>
           </a:p>
         </p:txBody>
@@ -16138,6 +16138,36 @@
       </p:grpSpPr>
       <p:sp>
         <p:nvSpPr>
+          <p:cNvPr id="2" name="Title 1"/>
+          <p:cNvSpPr>
+            <a:spLocks noGrp="1"/>
+          </p:cNvSpPr>
+          <p:nvPr>
+            <p:ph type="title"/>
+          </p:nvPr>
+        </p:nvSpPr>
+        <p:spPr/>
+        <p:txBody>
+          <a:bodyPr>
+            <a:normAutofit/>
+          </a:bodyPr>
+          <a:lstStyle/>
+          <a:p>
+            <a:r>
+              <a:rPr lang="en-US" sz="4400" dirty="0">
+                <a:solidFill>
+                  <a:schemeClr val="tx1"/>
+                </a:solidFill>
+                <a:latin typeface="Segoe UI Light" panose="020B0502040204020203" pitchFamily="34" charset="0"/>
+                <a:cs typeface="Segoe UI Light" panose="020B0502040204020203" pitchFamily="34" charset="0"/>
+              </a:rPr>
+              <a:t>Wrap-up</a:t>
+            </a:r>
+          </a:p>
+        </p:txBody>
+      </p:sp>
+      <p:sp>
+        <p:nvSpPr>
           <p:cNvPr id="9" name="TextBox 8">
             <a:extLst>
               <a:ext uri="{FF2B5EF4-FFF2-40B4-BE49-F238E27FC236}">
@@ -16255,36 +16285,6 @@
                 <a:cs typeface="Segoe UI Semilight" panose="020B0402040204020203" pitchFamily="34" charset="0"/>
               </a:rPr>
               <a:t>15 minutes</a:t>
-            </a:r>
-          </a:p>
-        </p:txBody>
-      </p:sp>
-      <p:sp>
-        <p:nvSpPr>
-          <p:cNvPr id="2" name="Title 1"/>
-          <p:cNvSpPr>
-            <a:spLocks noGrp="1"/>
-          </p:cNvSpPr>
-          <p:nvPr>
-            <p:ph type="title"/>
-          </p:nvPr>
-        </p:nvSpPr>
-        <p:spPr/>
-        <p:txBody>
-          <a:bodyPr>
-            <a:normAutofit/>
-          </a:bodyPr>
-          <a:lstStyle/>
-          <a:p>
-            <a:r>
-              <a:rPr lang="en-US" sz="4400" dirty="0">
-                <a:solidFill>
-                  <a:schemeClr val="tx1"/>
-                </a:solidFill>
-                <a:latin typeface="Segoe UI Light" panose="020B0502040204020203" pitchFamily="34" charset="0"/>
-                <a:cs typeface="Segoe UI Light" panose="020B0502040204020203" pitchFamily="34" charset="0"/>
-              </a:rPr>
-              <a:t>Wrap-up</a:t>
             </a:r>
           </a:p>
         </p:txBody>
@@ -16337,6 +16337,49 @@
       </p:grpSpPr>
       <p:sp>
         <p:nvSpPr>
+          <p:cNvPr id="2" name="Title 1"/>
+          <p:cNvSpPr>
+            <a:spLocks noGrp="1"/>
+          </p:cNvSpPr>
+          <p:nvPr>
+            <p:ph type="title"/>
+          </p:nvPr>
+        </p:nvSpPr>
+        <p:spPr/>
+        <p:txBody>
+          <a:bodyPr>
+            <a:normAutofit fontScale="90000"/>
+          </a:bodyPr>
+          <a:lstStyle/>
+          <a:p>
+            <a:r>
+              <a:rPr lang="en-US" sz="4900" dirty="0">
+                <a:solidFill>
+                  <a:schemeClr val="tx1"/>
+                </a:solidFill>
+                <a:cs typeface="Segoe UI" panose="020B0502040204020203" pitchFamily="34" charset="0"/>
+              </a:rPr>
+              <a:t>Preferred target audience</a:t>
+            </a:r>
+            <a:br>
+              <a:rPr lang="en-US" dirty="0">
+                <a:solidFill>
+                  <a:schemeClr val="tx1"/>
+                </a:solidFill>
+                <a:latin typeface="Segoe UI" panose="020B0502040204020203" pitchFamily="34" charset="0"/>
+              </a:rPr>
+            </a:br>
+            <a:endParaRPr lang="en-US" sz="3236" dirty="0">
+              <a:solidFill>
+                <a:schemeClr val="tx1"/>
+              </a:solidFill>
+              <a:latin typeface="Segoe UI" panose="020B0502040204020203" pitchFamily="34" charset="0"/>
+            </a:endParaRPr>
+          </a:p>
+        </p:txBody>
+      </p:sp>
+      <p:sp>
+        <p:nvSpPr>
           <p:cNvPr id="3" name="Content Placeholder 2"/>
           <p:cNvSpPr>
             <a:spLocks noGrp="1"/>
@@ -16386,49 +16429,6 @@
               <a:solidFill>
                 <a:schemeClr val="tx1"/>
               </a:solidFill>
-            </a:endParaRPr>
-          </a:p>
-        </p:txBody>
-      </p:sp>
-      <p:sp>
-        <p:nvSpPr>
-          <p:cNvPr id="2" name="Title 1"/>
-          <p:cNvSpPr>
-            <a:spLocks noGrp="1"/>
-          </p:cNvSpPr>
-          <p:nvPr>
-            <p:ph type="title"/>
-          </p:nvPr>
-        </p:nvSpPr>
-        <p:spPr/>
-        <p:txBody>
-          <a:bodyPr>
-            <a:normAutofit fontScale="90000"/>
-          </a:bodyPr>
-          <a:lstStyle/>
-          <a:p>
-            <a:r>
-              <a:rPr lang="en-US" sz="4900" dirty="0">
-                <a:solidFill>
-                  <a:schemeClr val="tx1"/>
-                </a:solidFill>
-                <a:cs typeface="Segoe UI" panose="020B0502040204020203" pitchFamily="34" charset="0"/>
-              </a:rPr>
-              <a:t>Preferred target audience</a:t>
-            </a:r>
-            <a:br>
-              <a:rPr lang="en-US" dirty="0">
-                <a:solidFill>
-                  <a:schemeClr val="tx1"/>
-                </a:solidFill>
-                <a:latin typeface="Segoe UI" panose="020B0502040204020203" pitchFamily="34" charset="0"/>
-              </a:rPr>
-            </a:br>
-            <a:endParaRPr lang="en-US" sz="3236" dirty="0">
-              <a:solidFill>
-                <a:schemeClr val="tx1"/>
-              </a:solidFill>
-              <a:latin typeface="Segoe UI" panose="020B0502040204020203" pitchFamily="34" charset="0"/>
             </a:endParaRPr>
           </a:p>
         </p:txBody>
@@ -16590,6 +16590,49 @@
       </p:grpSpPr>
       <p:sp>
         <p:nvSpPr>
+          <p:cNvPr id="2" name="Title 1"/>
+          <p:cNvSpPr>
+            <a:spLocks noGrp="1"/>
+          </p:cNvSpPr>
+          <p:nvPr>
+            <p:ph type="title"/>
+          </p:nvPr>
+        </p:nvSpPr>
+        <p:spPr/>
+        <p:txBody>
+          <a:bodyPr>
+            <a:normAutofit fontScale="90000"/>
+          </a:bodyPr>
+          <a:lstStyle/>
+          <a:p>
+            <a:r>
+              <a:rPr lang="en-US" sz="4900" dirty="0">
+                <a:solidFill>
+                  <a:schemeClr val="tx1"/>
+                </a:solidFill>
+                <a:cs typeface="Segoe UI" panose="020B0502040204020203" pitchFamily="34" charset="0"/>
+              </a:rPr>
+              <a:t>Preferred solution – component classification (1)</a:t>
+            </a:r>
+            <a:br>
+              <a:rPr lang="en-US" dirty="0">
+                <a:solidFill>
+                  <a:schemeClr val="tx1"/>
+                </a:solidFill>
+                <a:latin typeface="Segoe UI" panose="020B0502040204020203" pitchFamily="34" charset="0"/>
+              </a:rPr>
+            </a:br>
+            <a:endParaRPr lang="en-US" sz="3236" dirty="0">
+              <a:solidFill>
+                <a:schemeClr val="tx1"/>
+              </a:solidFill>
+              <a:latin typeface="Segoe UI" panose="020B0502040204020203" pitchFamily="34" charset="0"/>
+            </a:endParaRPr>
+          </a:p>
+        </p:txBody>
+      </p:sp>
+      <p:sp>
+        <p:nvSpPr>
           <p:cNvPr id="3" name="Content Placeholder 2"/>
           <p:cNvSpPr>
             <a:spLocks noGrp="1"/>
@@ -16709,49 +16752,6 @@
               <a:solidFill>
                 <a:schemeClr val="tx1"/>
               </a:solidFill>
-            </a:endParaRPr>
-          </a:p>
-        </p:txBody>
-      </p:sp>
-      <p:sp>
-        <p:nvSpPr>
-          <p:cNvPr id="2" name="Title 1"/>
-          <p:cNvSpPr>
-            <a:spLocks noGrp="1"/>
-          </p:cNvSpPr>
-          <p:nvPr>
-            <p:ph type="title"/>
-          </p:nvPr>
-        </p:nvSpPr>
-        <p:spPr/>
-        <p:txBody>
-          <a:bodyPr>
-            <a:normAutofit fontScale="90000"/>
-          </a:bodyPr>
-          <a:lstStyle/>
-          <a:p>
-            <a:r>
-              <a:rPr lang="en-US" sz="4900" dirty="0">
-                <a:solidFill>
-                  <a:schemeClr val="tx1"/>
-                </a:solidFill>
-                <a:cs typeface="Segoe UI" panose="020B0502040204020203" pitchFamily="34" charset="0"/>
-              </a:rPr>
-              <a:t>Preferred solution – component classification (1)</a:t>
-            </a:r>
-            <a:br>
-              <a:rPr lang="en-US" dirty="0">
-                <a:solidFill>
-                  <a:schemeClr val="tx1"/>
-                </a:solidFill>
-                <a:latin typeface="Segoe UI" panose="020B0502040204020203" pitchFamily="34" charset="0"/>
-              </a:rPr>
-            </a:br>
-            <a:endParaRPr lang="en-US" sz="3236" dirty="0">
-              <a:solidFill>
-                <a:schemeClr val="tx1"/>
-              </a:solidFill>
-              <a:latin typeface="Segoe UI" panose="020B0502040204020203" pitchFamily="34" charset="0"/>
             </a:endParaRPr>
           </a:p>
         </p:txBody>
@@ -16796,6 +16796,49 @@
       </p:grpSpPr>
       <p:sp>
         <p:nvSpPr>
+          <p:cNvPr id="2" name="Title 1"/>
+          <p:cNvSpPr>
+            <a:spLocks noGrp="1"/>
+          </p:cNvSpPr>
+          <p:nvPr>
+            <p:ph type="title"/>
+          </p:nvPr>
+        </p:nvSpPr>
+        <p:spPr/>
+        <p:txBody>
+          <a:bodyPr>
+            <a:normAutofit fontScale="90000"/>
+          </a:bodyPr>
+          <a:lstStyle/>
+          <a:p>
+            <a:r>
+              <a:rPr lang="en-US" sz="4900" dirty="0">
+                <a:solidFill>
+                  <a:schemeClr val="tx1"/>
+                </a:solidFill>
+                <a:cs typeface="Segoe UI" panose="020B0502040204020203" pitchFamily="34" charset="0"/>
+              </a:rPr>
+              <a:t>Preferred solution – component classification (2,3,4)</a:t>
+            </a:r>
+            <a:br>
+              <a:rPr lang="en-US" dirty="0">
+                <a:solidFill>
+                  <a:schemeClr val="tx1"/>
+                </a:solidFill>
+                <a:latin typeface="Segoe UI" panose="020B0502040204020203" pitchFamily="34" charset="0"/>
+              </a:rPr>
+            </a:br>
+            <a:endParaRPr lang="en-US" sz="3236" dirty="0">
+              <a:solidFill>
+                <a:schemeClr val="tx1"/>
+              </a:solidFill>
+              <a:latin typeface="Segoe UI" panose="020B0502040204020203" pitchFamily="34" charset="0"/>
+            </a:endParaRPr>
+          </a:p>
+        </p:txBody>
+      </p:sp>
+      <p:sp>
+        <p:nvSpPr>
           <p:cNvPr id="3" name="Content Placeholder 2"/>
           <p:cNvSpPr>
             <a:spLocks noGrp="1"/>
@@ -16930,49 +16973,6 @@
               <a:solidFill>
                 <a:schemeClr val="tx1"/>
               </a:solidFill>
-            </a:endParaRPr>
-          </a:p>
-        </p:txBody>
-      </p:sp>
-      <p:sp>
-        <p:nvSpPr>
-          <p:cNvPr id="2" name="Title 1"/>
-          <p:cNvSpPr>
-            <a:spLocks noGrp="1"/>
-          </p:cNvSpPr>
-          <p:nvPr>
-            <p:ph type="title"/>
-          </p:nvPr>
-        </p:nvSpPr>
-        <p:spPr/>
-        <p:txBody>
-          <a:bodyPr>
-            <a:normAutofit fontScale="90000"/>
-          </a:bodyPr>
-          <a:lstStyle/>
-          <a:p>
-            <a:r>
-              <a:rPr lang="en-US" sz="4900" dirty="0">
-                <a:solidFill>
-                  <a:schemeClr val="tx1"/>
-                </a:solidFill>
-                <a:cs typeface="Segoe UI" panose="020B0502040204020203" pitchFamily="34" charset="0"/>
-              </a:rPr>
-              <a:t>Preferred solution – component classification (2,3,4)</a:t>
-            </a:r>
-            <a:br>
-              <a:rPr lang="en-US" dirty="0">
-                <a:solidFill>
-                  <a:schemeClr val="tx1"/>
-                </a:solidFill>
-                <a:latin typeface="Segoe UI" panose="020B0502040204020203" pitchFamily="34" charset="0"/>
-              </a:rPr>
-            </a:br>
-            <a:endParaRPr lang="en-US" sz="3236" dirty="0">
-              <a:solidFill>
-                <a:schemeClr val="tx1"/>
-              </a:solidFill>
-              <a:latin typeface="Segoe UI" panose="020B0502040204020203" pitchFamily="34" charset="0"/>
             </a:endParaRPr>
           </a:p>
         </p:txBody>
@@ -17017,6 +17017,49 @@
       </p:grpSpPr>
       <p:sp>
         <p:nvSpPr>
+          <p:cNvPr id="2" name="Title 1"/>
+          <p:cNvSpPr>
+            <a:spLocks noGrp="1"/>
+          </p:cNvSpPr>
+          <p:nvPr>
+            <p:ph type="title"/>
+          </p:nvPr>
+        </p:nvSpPr>
+        <p:spPr/>
+        <p:txBody>
+          <a:bodyPr>
+            <a:normAutofit fontScale="90000"/>
+          </a:bodyPr>
+          <a:lstStyle/>
+          <a:p>
+            <a:r>
+              <a:rPr lang="en-US" sz="4900" dirty="0">
+                <a:solidFill>
+                  <a:schemeClr val="tx1"/>
+                </a:solidFill>
+                <a:cs typeface="Segoe UI" panose="020B0502040204020203" pitchFamily="34" charset="0"/>
+              </a:rPr>
+              <a:t>Preferred solution – component classification (5)</a:t>
+            </a:r>
+            <a:br>
+              <a:rPr lang="en-US" dirty="0">
+                <a:solidFill>
+                  <a:schemeClr val="tx1"/>
+                </a:solidFill>
+                <a:latin typeface="Segoe UI" panose="020B0502040204020203" pitchFamily="34" charset="0"/>
+              </a:rPr>
+            </a:br>
+            <a:endParaRPr lang="en-US" sz="3236" dirty="0">
+              <a:solidFill>
+                <a:schemeClr val="tx1"/>
+              </a:solidFill>
+              <a:latin typeface="Segoe UI" panose="020B0502040204020203" pitchFamily="34" charset="0"/>
+            </a:endParaRPr>
+          </a:p>
+        </p:txBody>
+      </p:sp>
+      <p:sp>
+        <p:nvSpPr>
           <p:cNvPr id="3" name="Content Placeholder 2"/>
           <p:cNvSpPr>
             <a:spLocks noGrp="1"/>
@@ -17120,49 +17163,6 @@
               <a:solidFill>
                 <a:schemeClr val="tx1"/>
               </a:solidFill>
-            </a:endParaRPr>
-          </a:p>
-        </p:txBody>
-      </p:sp>
-      <p:sp>
-        <p:nvSpPr>
-          <p:cNvPr id="2" name="Title 1"/>
-          <p:cNvSpPr>
-            <a:spLocks noGrp="1"/>
-          </p:cNvSpPr>
-          <p:nvPr>
-            <p:ph type="title"/>
-          </p:nvPr>
-        </p:nvSpPr>
-        <p:spPr/>
-        <p:txBody>
-          <a:bodyPr>
-            <a:normAutofit fontScale="90000"/>
-          </a:bodyPr>
-          <a:lstStyle/>
-          <a:p>
-            <a:r>
-              <a:rPr lang="en-US" sz="4900" dirty="0">
-                <a:solidFill>
-                  <a:schemeClr val="tx1"/>
-                </a:solidFill>
-                <a:cs typeface="Segoe UI" panose="020B0502040204020203" pitchFamily="34" charset="0"/>
-              </a:rPr>
-              <a:t>Preferred solution – component classification (5)</a:t>
-            </a:r>
-            <a:br>
-              <a:rPr lang="en-US" dirty="0">
-                <a:solidFill>
-                  <a:schemeClr val="tx1"/>
-                </a:solidFill>
-                <a:latin typeface="Segoe UI" panose="020B0502040204020203" pitchFamily="34" charset="0"/>
-              </a:rPr>
-            </a:br>
-            <a:endParaRPr lang="en-US" sz="3236" dirty="0">
-              <a:solidFill>
-                <a:schemeClr val="tx1"/>
-              </a:solidFill>
-              <a:latin typeface="Segoe UI" panose="020B0502040204020203" pitchFamily="34" charset="0"/>
             </a:endParaRPr>
           </a:p>
         </p:txBody>
@@ -17207,6 +17207,49 @@
       </p:grpSpPr>
       <p:sp>
         <p:nvSpPr>
+          <p:cNvPr id="2" name="Title 1"/>
+          <p:cNvSpPr>
+            <a:spLocks noGrp="1"/>
+          </p:cNvSpPr>
+          <p:nvPr>
+            <p:ph type="title"/>
+          </p:nvPr>
+        </p:nvSpPr>
+        <p:spPr/>
+        <p:txBody>
+          <a:bodyPr>
+            <a:normAutofit fontScale="90000"/>
+          </a:bodyPr>
+          <a:lstStyle/>
+          <a:p>
+            <a:r>
+              <a:rPr lang="en-US" sz="4900" dirty="0">
+                <a:solidFill>
+                  <a:schemeClr val="tx1"/>
+                </a:solidFill>
+                <a:cs typeface="Segoe UI" panose="020B0502040204020203" pitchFamily="34" charset="0"/>
+              </a:rPr>
+              <a:t>Preferred solution – component classification (6.1)</a:t>
+            </a:r>
+            <a:br>
+              <a:rPr lang="en-US" dirty="0">
+                <a:solidFill>
+                  <a:schemeClr val="tx1"/>
+                </a:solidFill>
+                <a:latin typeface="Segoe UI" panose="020B0502040204020203" pitchFamily="34" charset="0"/>
+              </a:rPr>
+            </a:br>
+            <a:endParaRPr lang="en-US" sz="3236" dirty="0">
+              <a:solidFill>
+                <a:schemeClr val="tx1"/>
+              </a:solidFill>
+              <a:latin typeface="Segoe UI" panose="020B0502040204020203" pitchFamily="34" charset="0"/>
+            </a:endParaRPr>
+          </a:p>
+        </p:txBody>
+      </p:sp>
+      <p:sp>
+        <p:nvSpPr>
           <p:cNvPr id="3" name="Content Placeholder 2"/>
           <p:cNvSpPr>
             <a:spLocks noGrp="1"/>
@@ -17289,49 +17332,6 @@
               <a:solidFill>
                 <a:schemeClr val="tx1"/>
               </a:solidFill>
-            </a:endParaRPr>
-          </a:p>
-        </p:txBody>
-      </p:sp>
-      <p:sp>
-        <p:nvSpPr>
-          <p:cNvPr id="2" name="Title 1"/>
-          <p:cNvSpPr>
-            <a:spLocks noGrp="1"/>
-          </p:cNvSpPr>
-          <p:nvPr>
-            <p:ph type="title"/>
-          </p:nvPr>
-        </p:nvSpPr>
-        <p:spPr/>
-        <p:txBody>
-          <a:bodyPr>
-            <a:normAutofit fontScale="90000"/>
-          </a:bodyPr>
-          <a:lstStyle/>
-          <a:p>
-            <a:r>
-              <a:rPr lang="en-US" sz="4900" dirty="0">
-                <a:solidFill>
-                  <a:schemeClr val="tx1"/>
-                </a:solidFill>
-                <a:cs typeface="Segoe UI" panose="020B0502040204020203" pitchFamily="34" charset="0"/>
-              </a:rPr>
-              <a:t>Preferred solution – component classification (6.1)</a:t>
-            </a:r>
-            <a:br>
-              <a:rPr lang="en-US" dirty="0">
-                <a:solidFill>
-                  <a:schemeClr val="tx1"/>
-                </a:solidFill>
-                <a:latin typeface="Segoe UI" panose="020B0502040204020203" pitchFamily="34" charset="0"/>
-              </a:rPr>
-            </a:br>
-            <a:endParaRPr lang="en-US" sz="3236" dirty="0">
-              <a:solidFill>
-                <a:schemeClr val="tx1"/>
-              </a:solidFill>
-              <a:latin typeface="Segoe UI" panose="020B0502040204020203" pitchFamily="34" charset="0"/>
             </a:endParaRPr>
           </a:p>
         </p:txBody>
@@ -17376,6 +17376,49 @@
       </p:grpSpPr>
       <p:sp>
         <p:nvSpPr>
+          <p:cNvPr id="2" name="Title 1"/>
+          <p:cNvSpPr>
+            <a:spLocks noGrp="1"/>
+          </p:cNvSpPr>
+          <p:nvPr>
+            <p:ph type="title"/>
+          </p:nvPr>
+        </p:nvSpPr>
+        <p:spPr/>
+        <p:txBody>
+          <a:bodyPr>
+            <a:normAutofit fontScale="90000"/>
+          </a:bodyPr>
+          <a:lstStyle/>
+          <a:p>
+            <a:r>
+              <a:rPr lang="en-US" sz="4900" dirty="0">
+                <a:solidFill>
+                  <a:schemeClr val="tx1"/>
+                </a:solidFill>
+                <a:cs typeface="Segoe UI" panose="020B0502040204020203" pitchFamily="34" charset="0"/>
+              </a:rPr>
+              <a:t>Preferred solution – component classification (6.2)</a:t>
+            </a:r>
+            <a:br>
+              <a:rPr lang="en-US" dirty="0">
+                <a:solidFill>
+                  <a:schemeClr val="tx1"/>
+                </a:solidFill>
+                <a:latin typeface="Segoe UI" panose="020B0502040204020203" pitchFamily="34" charset="0"/>
+              </a:rPr>
+            </a:br>
+            <a:endParaRPr lang="en-US" sz="3236" dirty="0">
+              <a:solidFill>
+                <a:schemeClr val="tx1"/>
+              </a:solidFill>
+              <a:latin typeface="Segoe UI" panose="020B0502040204020203" pitchFamily="34" charset="0"/>
+            </a:endParaRPr>
+          </a:p>
+        </p:txBody>
+      </p:sp>
+      <p:sp>
+        <p:nvSpPr>
           <p:cNvPr id="3" name="Content Placeholder 2"/>
           <p:cNvSpPr>
             <a:spLocks noGrp="1"/>
@@ -17492,49 +17535,6 @@
               <a:solidFill>
                 <a:schemeClr val="tx1"/>
               </a:solidFill>
-            </a:endParaRPr>
-          </a:p>
-        </p:txBody>
-      </p:sp>
-      <p:sp>
-        <p:nvSpPr>
-          <p:cNvPr id="2" name="Title 1"/>
-          <p:cNvSpPr>
-            <a:spLocks noGrp="1"/>
-          </p:cNvSpPr>
-          <p:nvPr>
-            <p:ph type="title"/>
-          </p:nvPr>
-        </p:nvSpPr>
-        <p:spPr/>
-        <p:txBody>
-          <a:bodyPr>
-            <a:normAutofit fontScale="90000"/>
-          </a:bodyPr>
-          <a:lstStyle/>
-          <a:p>
-            <a:r>
-              <a:rPr lang="en-US" sz="4900" dirty="0">
-                <a:solidFill>
-                  <a:schemeClr val="tx1"/>
-                </a:solidFill>
-                <a:cs typeface="Segoe UI" panose="020B0502040204020203" pitchFamily="34" charset="0"/>
-              </a:rPr>
-              <a:t>Preferred solution – component classification (6.2)</a:t>
-            </a:r>
-            <a:br>
-              <a:rPr lang="en-US" dirty="0">
-                <a:solidFill>
-                  <a:schemeClr val="tx1"/>
-                </a:solidFill>
-                <a:latin typeface="Segoe UI" panose="020B0502040204020203" pitchFamily="34" charset="0"/>
-              </a:rPr>
-            </a:br>
-            <a:endParaRPr lang="en-US" sz="3236" dirty="0">
-              <a:solidFill>
-                <a:schemeClr val="tx1"/>
-              </a:solidFill>
-              <a:latin typeface="Segoe UI" panose="020B0502040204020203" pitchFamily="34" charset="0"/>
             </a:endParaRPr>
           </a:p>
         </p:txBody>
@@ -17587,6 +17587,36 @@
       </p:grpSpPr>
       <p:sp>
         <p:nvSpPr>
+          <p:cNvPr id="2" name="Title 1"/>
+          <p:cNvSpPr>
+            <a:spLocks noGrp="1"/>
+          </p:cNvSpPr>
+          <p:nvPr>
+            <p:ph type="title"/>
+          </p:nvPr>
+        </p:nvSpPr>
+        <p:spPr/>
+        <p:txBody>
+          <a:bodyPr>
+            <a:normAutofit/>
+          </a:bodyPr>
+          <a:lstStyle/>
+          <a:p>
+            <a:r>
+              <a:rPr lang="en-US" sz="4400" dirty="0">
+                <a:solidFill>
+                  <a:schemeClr val="tx1"/>
+                </a:solidFill>
+                <a:latin typeface="Segoe UI Light" panose="020B0502040204020203" pitchFamily="34" charset="0"/>
+                <a:cs typeface="Segoe UI Light" panose="020B0502040204020203" pitchFamily="34" charset="0"/>
+              </a:rPr>
+              <a:t>Abstract and learning objectives</a:t>
+            </a:r>
+          </a:p>
+        </p:txBody>
+      </p:sp>
+      <p:sp>
+        <p:nvSpPr>
           <p:cNvPr id="9" name="TextBox 2">
             <a:extLst>
               <a:ext uri="{FF2B5EF4-FFF2-40B4-BE49-F238E27FC236}">
@@ -17637,36 +17667,6 @@
               </a:spcAft>
             </a:pPr>
             <a:endParaRPr lang="en-US" sz="2400" dirty="0"/>
-          </a:p>
-        </p:txBody>
-      </p:sp>
-      <p:sp>
-        <p:nvSpPr>
-          <p:cNvPr id="2" name="Title 1"/>
-          <p:cNvSpPr>
-            <a:spLocks noGrp="1"/>
-          </p:cNvSpPr>
-          <p:nvPr>
-            <p:ph type="title"/>
-          </p:nvPr>
-        </p:nvSpPr>
-        <p:spPr/>
-        <p:txBody>
-          <a:bodyPr>
-            <a:normAutofit/>
-          </a:bodyPr>
-          <a:lstStyle/>
-          <a:p>
-            <a:r>
-              <a:rPr lang="en-US" sz="4400" dirty="0">
-                <a:solidFill>
-                  <a:schemeClr val="tx1"/>
-                </a:solidFill>
-                <a:latin typeface="Segoe UI Light" panose="020B0502040204020203" pitchFamily="34" charset="0"/>
-                <a:cs typeface="Segoe UI Light" panose="020B0502040204020203" pitchFamily="34" charset="0"/>
-              </a:rPr>
-              <a:t>Abstract and learning objectives</a:t>
-            </a:r>
           </a:p>
         </p:txBody>
       </p:sp>
@@ -17708,6 +17708,65 @@
           <a:chExt cx="0" cy="0"/>
         </a:xfrm>
       </p:grpSpPr>
+      <p:sp>
+        <p:nvSpPr>
+          <p:cNvPr id="2" name="Title 1"/>
+          <p:cNvSpPr>
+            <a:spLocks noGrp="1"/>
+          </p:cNvSpPr>
+          <p:nvPr>
+            <p:ph type="title"/>
+          </p:nvPr>
+        </p:nvSpPr>
+        <p:spPr/>
+        <p:txBody>
+          <a:bodyPr>
+            <a:normAutofit fontScale="90000"/>
+          </a:bodyPr>
+          <a:lstStyle/>
+          <a:p>
+            <a:r>
+              <a:rPr lang="en-US" sz="4900" dirty="0">
+                <a:solidFill>
+                  <a:schemeClr val="tx1"/>
+                </a:solidFill>
+                <a:cs typeface="Segoe UI" panose="020B0502040204020203" pitchFamily="34" charset="0"/>
+              </a:rPr>
+              <a:t>Preferred solution - </a:t>
+            </a:r>
+            <a:r>
+              <a:rPr lang="en-US" sz="4800" dirty="0">
+                <a:solidFill>
+                  <a:schemeClr val="tx1"/>
+                </a:solidFill>
+              </a:rPr>
+              <a:t>component classification (7)</a:t>
+            </a:r>
+            <a:br>
+              <a:rPr lang="en-US" dirty="0">
+                <a:solidFill>
+                  <a:schemeClr val="tx1"/>
+                </a:solidFill>
+                <a:latin typeface="Segoe UI" panose="020B0502040204020203" pitchFamily="34" charset="0"/>
+              </a:rPr>
+            </a:br>
+            <a:br>
+              <a:rPr lang="en-US" dirty="0">
+                <a:solidFill>
+                  <a:schemeClr val="tx1"/>
+                </a:solidFill>
+                <a:latin typeface="Segoe UI" panose="020B0502040204020203" pitchFamily="34" charset="0"/>
+              </a:rPr>
+            </a:br>
+            <a:endParaRPr lang="en-US" sz="3236" dirty="0">
+              <a:solidFill>
+                <a:schemeClr val="tx1"/>
+              </a:solidFill>
+              <a:latin typeface="Segoe UI" panose="020B0502040204020203" pitchFamily="34" charset="0"/>
+            </a:endParaRPr>
+          </a:p>
+        </p:txBody>
+      </p:sp>
       <p:pic>
         <p:nvPicPr>
           <p:cNvPr id="5" name="Picture 4" descr="Process diagram showing the activities that happen when running a pipeline, as described in the speaker notes.">
@@ -17804,65 +17863,6 @@
           </a:p>
         </p:txBody>
       </p:sp>
-      <p:sp>
-        <p:nvSpPr>
-          <p:cNvPr id="2" name="Title 1"/>
-          <p:cNvSpPr>
-            <a:spLocks noGrp="1"/>
-          </p:cNvSpPr>
-          <p:nvPr>
-            <p:ph type="title"/>
-          </p:nvPr>
-        </p:nvSpPr>
-        <p:spPr/>
-        <p:txBody>
-          <a:bodyPr>
-            <a:normAutofit fontScale="90000"/>
-          </a:bodyPr>
-          <a:lstStyle/>
-          <a:p>
-            <a:r>
-              <a:rPr lang="en-US" sz="4900" dirty="0">
-                <a:solidFill>
-                  <a:schemeClr val="tx1"/>
-                </a:solidFill>
-                <a:cs typeface="Segoe UI" panose="020B0502040204020203" pitchFamily="34" charset="0"/>
-              </a:rPr>
-              <a:t>Preferred solution - </a:t>
-            </a:r>
-            <a:r>
-              <a:rPr lang="en-US" sz="4800" dirty="0">
-                <a:solidFill>
-                  <a:schemeClr val="tx1"/>
-                </a:solidFill>
-              </a:rPr>
-              <a:t>component classification (7)</a:t>
-            </a:r>
-            <a:br>
-              <a:rPr lang="en-US" dirty="0">
-                <a:solidFill>
-                  <a:schemeClr val="tx1"/>
-                </a:solidFill>
-                <a:latin typeface="Segoe UI" panose="020B0502040204020203" pitchFamily="34" charset="0"/>
-              </a:rPr>
-            </a:br>
-            <a:br>
-              <a:rPr lang="en-US" dirty="0">
-                <a:solidFill>
-                  <a:schemeClr val="tx1"/>
-                </a:solidFill>
-                <a:latin typeface="Segoe UI" panose="020B0502040204020203" pitchFamily="34" charset="0"/>
-              </a:rPr>
-            </a:br>
-            <a:endParaRPr lang="en-US" sz="3236" dirty="0">
-              <a:solidFill>
-                <a:schemeClr val="tx1"/>
-              </a:solidFill>
-              <a:latin typeface="Segoe UI" panose="020B0502040204020203" pitchFamily="34" charset="0"/>
-            </a:endParaRPr>
-          </a:p>
-        </p:txBody>
-      </p:sp>
     </p:spTree>
     <p:extLst>
       <p:ext uri="{BB962C8B-B14F-4D97-AF65-F5344CB8AC3E}">
@@ -17903,6 +17903,59 @@
       </p:grpSpPr>
       <p:sp>
         <p:nvSpPr>
+          <p:cNvPr id="2" name="Title 1"/>
+          <p:cNvSpPr>
+            <a:spLocks noGrp="1"/>
+          </p:cNvSpPr>
+          <p:nvPr>
+            <p:ph type="title"/>
+          </p:nvPr>
+        </p:nvSpPr>
+        <p:spPr/>
+        <p:txBody>
+          <a:bodyPr>
+            <a:normAutofit/>
+          </a:bodyPr>
+          <a:lstStyle/>
+          <a:p>
+            <a:r>
+              <a:rPr lang="en-US" sz="4900" dirty="0">
+                <a:solidFill>
+                  <a:schemeClr val="tx1"/>
+                </a:solidFill>
+                <a:cs typeface="Segoe UI" panose="020B0502040204020203" pitchFamily="34" charset="0"/>
+              </a:rPr>
+              <a:t>Preferred solution – </a:t>
+            </a:r>
+            <a:r>
+              <a:rPr lang="en-US" sz="4900" dirty="0" err="1">
+                <a:solidFill>
+                  <a:schemeClr val="tx1"/>
+                </a:solidFill>
+                <a:cs typeface="Segoe UI" panose="020B0502040204020203" pitchFamily="34" charset="0"/>
+              </a:rPr>
+              <a:t>MLOps</a:t>
+            </a:r>
+            <a:r>
+              <a:rPr lang="en-US" sz="4900" dirty="0">
+                <a:solidFill>
+                  <a:schemeClr val="tx1"/>
+                </a:solidFill>
+                <a:cs typeface="Segoe UI" panose="020B0502040204020203" pitchFamily="34" charset="0"/>
+              </a:rPr>
+              <a:t> (1,2,3) </a:t>
+            </a:r>
+            <a:endParaRPr lang="en-US" sz="3236" dirty="0">
+              <a:solidFill>
+                <a:schemeClr val="tx1"/>
+              </a:solidFill>
+              <a:latin typeface="Segoe UI" panose="020B0502040204020203" pitchFamily="34" charset="0"/>
+            </a:endParaRPr>
+          </a:p>
+        </p:txBody>
+      </p:sp>
+      <p:sp>
+        <p:nvSpPr>
           <p:cNvPr id="3" name="Content Placeholder 2"/>
           <p:cNvSpPr>
             <a:spLocks noGrp="1"/>
@@ -18036,59 +18089,6 @@
               <a:solidFill>
                 <a:schemeClr val="tx1"/>
               </a:solidFill>
-            </a:endParaRPr>
-          </a:p>
-        </p:txBody>
-      </p:sp>
-      <p:sp>
-        <p:nvSpPr>
-          <p:cNvPr id="2" name="Title 1"/>
-          <p:cNvSpPr>
-            <a:spLocks noGrp="1"/>
-          </p:cNvSpPr>
-          <p:nvPr>
-            <p:ph type="title"/>
-          </p:nvPr>
-        </p:nvSpPr>
-        <p:spPr/>
-        <p:txBody>
-          <a:bodyPr>
-            <a:normAutofit/>
-          </a:bodyPr>
-          <a:lstStyle/>
-          <a:p>
-            <a:r>
-              <a:rPr lang="en-US" sz="4900" dirty="0">
-                <a:solidFill>
-                  <a:schemeClr val="tx1"/>
-                </a:solidFill>
-                <a:cs typeface="Segoe UI" panose="020B0502040204020203" pitchFamily="34" charset="0"/>
-              </a:rPr>
-              <a:t>Preferred solution – </a:t>
-            </a:r>
-            <a:r>
-              <a:rPr lang="en-US" sz="4900" dirty="0" err="1">
-                <a:solidFill>
-                  <a:schemeClr val="tx1"/>
-                </a:solidFill>
-                <a:cs typeface="Segoe UI" panose="020B0502040204020203" pitchFamily="34" charset="0"/>
-              </a:rPr>
-              <a:t>MLOps</a:t>
-            </a:r>
-            <a:r>
-              <a:rPr lang="en-US" sz="4900" dirty="0">
-                <a:solidFill>
-                  <a:schemeClr val="tx1"/>
-                </a:solidFill>
-                <a:cs typeface="Segoe UI" panose="020B0502040204020203" pitchFamily="34" charset="0"/>
-              </a:rPr>
-              <a:t> (1,2,3) </a:t>
-            </a:r>
-            <a:endParaRPr lang="en-US" sz="3236" dirty="0">
-              <a:solidFill>
-                <a:schemeClr val="tx1"/>
-              </a:solidFill>
-              <a:latin typeface="Segoe UI" panose="020B0502040204020203" pitchFamily="34" charset="0"/>
             </a:endParaRPr>
           </a:p>
         </p:txBody>
@@ -18133,6 +18133,67 @@
       </p:grpSpPr>
       <p:sp>
         <p:nvSpPr>
+          <p:cNvPr id="2" name="Title 1"/>
+          <p:cNvSpPr>
+            <a:spLocks noGrp="1"/>
+          </p:cNvSpPr>
+          <p:nvPr>
+            <p:ph type="title"/>
+          </p:nvPr>
+        </p:nvSpPr>
+        <p:spPr/>
+        <p:txBody>
+          <a:bodyPr>
+            <a:normAutofit fontScale="90000"/>
+          </a:bodyPr>
+          <a:lstStyle/>
+          <a:p>
+            <a:r>
+              <a:rPr lang="en-US" sz="4900" dirty="0">
+                <a:solidFill>
+                  <a:schemeClr val="tx1"/>
+                </a:solidFill>
+                <a:cs typeface="Segoe UI" panose="020B0502040204020203" pitchFamily="34" charset="0"/>
+              </a:rPr>
+              <a:t>Preferred solution – </a:t>
+            </a:r>
+            <a:r>
+              <a:rPr lang="en-US" sz="4900" dirty="0" err="1">
+                <a:solidFill>
+                  <a:schemeClr val="tx1"/>
+                </a:solidFill>
+                <a:cs typeface="Segoe UI" panose="020B0502040204020203" pitchFamily="34" charset="0"/>
+              </a:rPr>
+              <a:t>MLOps</a:t>
+            </a:r>
+            <a:r>
+              <a:rPr lang="en-US" sz="4900" dirty="0">
+                <a:solidFill>
+                  <a:schemeClr val="tx1"/>
+                </a:solidFill>
+                <a:cs typeface="Segoe UI" panose="020B0502040204020203" pitchFamily="34" charset="0"/>
+              </a:rPr>
+              <a:t> (4)</a:t>
+            </a:r>
+            <a:br>
+              <a:rPr lang="en-US" dirty="0">
+                <a:solidFill>
+                  <a:schemeClr val="tx1"/>
+                </a:solidFill>
+                <a:latin typeface="Segoe UI" panose="020B0502040204020203" pitchFamily="34" charset="0"/>
+              </a:rPr>
+            </a:br>
+            <a:endParaRPr lang="en-US" sz="3236" dirty="0">
+              <a:solidFill>
+                <a:schemeClr val="tx1"/>
+              </a:solidFill>
+              <a:latin typeface="Segoe UI" panose="020B0502040204020203" pitchFamily="34" charset="0"/>
+            </a:endParaRPr>
+          </a:p>
+        </p:txBody>
+      </p:sp>
+      <p:sp>
+        <p:nvSpPr>
           <p:cNvPr id="3" name="Content Placeholder 2"/>
           <p:cNvSpPr>
             <a:spLocks noGrp="1"/>
@@ -18284,67 +18345,6 @@
               <a:solidFill>
                 <a:schemeClr val="tx1"/>
               </a:solidFill>
-            </a:endParaRPr>
-          </a:p>
-        </p:txBody>
-      </p:sp>
-      <p:sp>
-        <p:nvSpPr>
-          <p:cNvPr id="2" name="Title 1"/>
-          <p:cNvSpPr>
-            <a:spLocks noGrp="1"/>
-          </p:cNvSpPr>
-          <p:nvPr>
-            <p:ph type="title"/>
-          </p:nvPr>
-        </p:nvSpPr>
-        <p:spPr/>
-        <p:txBody>
-          <a:bodyPr>
-            <a:normAutofit fontScale="90000"/>
-          </a:bodyPr>
-          <a:lstStyle/>
-          <a:p>
-            <a:r>
-              <a:rPr lang="en-US" sz="4900" dirty="0">
-                <a:solidFill>
-                  <a:schemeClr val="tx1"/>
-                </a:solidFill>
-                <a:cs typeface="Segoe UI" panose="020B0502040204020203" pitchFamily="34" charset="0"/>
-              </a:rPr>
-              <a:t>Preferred solution – </a:t>
-            </a:r>
-            <a:r>
-              <a:rPr lang="en-US" sz="4900" dirty="0" err="1">
-                <a:solidFill>
-                  <a:schemeClr val="tx1"/>
-                </a:solidFill>
-                <a:cs typeface="Segoe UI" panose="020B0502040204020203" pitchFamily="34" charset="0"/>
-              </a:rPr>
-              <a:t>MLOps</a:t>
-            </a:r>
-            <a:r>
-              <a:rPr lang="en-US" sz="4900" dirty="0">
-                <a:solidFill>
-                  <a:schemeClr val="tx1"/>
-                </a:solidFill>
-                <a:cs typeface="Segoe UI" panose="020B0502040204020203" pitchFamily="34" charset="0"/>
-              </a:rPr>
-              <a:t> (4)</a:t>
-            </a:r>
-            <a:br>
-              <a:rPr lang="en-US" dirty="0">
-                <a:solidFill>
-                  <a:schemeClr val="tx1"/>
-                </a:solidFill>
-                <a:latin typeface="Segoe UI" panose="020B0502040204020203" pitchFamily="34" charset="0"/>
-              </a:rPr>
-            </a:br>
-            <a:endParaRPr lang="en-US" sz="3236" dirty="0">
-              <a:solidFill>
-                <a:schemeClr val="tx1"/>
-              </a:solidFill>
-              <a:latin typeface="Segoe UI" panose="020B0502040204020203" pitchFamily="34" charset="0"/>
             </a:endParaRPr>
           </a:p>
         </p:txBody>
@@ -18389,6 +18389,67 @@
       </p:grpSpPr>
       <p:sp>
         <p:nvSpPr>
+          <p:cNvPr id="2" name="Title 1"/>
+          <p:cNvSpPr>
+            <a:spLocks noGrp="1"/>
+          </p:cNvSpPr>
+          <p:nvPr>
+            <p:ph type="title"/>
+          </p:nvPr>
+        </p:nvSpPr>
+        <p:spPr/>
+        <p:txBody>
+          <a:bodyPr>
+            <a:normAutofit fontScale="90000"/>
+          </a:bodyPr>
+          <a:lstStyle/>
+          <a:p>
+            <a:r>
+              <a:rPr lang="en-US" sz="4900" dirty="0">
+                <a:solidFill>
+                  <a:schemeClr val="tx1"/>
+                </a:solidFill>
+                <a:cs typeface="Segoe UI" panose="020B0502040204020203" pitchFamily="34" charset="0"/>
+              </a:rPr>
+              <a:t>Preferred solution – </a:t>
+            </a:r>
+            <a:r>
+              <a:rPr lang="en-US" sz="4900" dirty="0" err="1">
+                <a:solidFill>
+                  <a:schemeClr val="tx1"/>
+                </a:solidFill>
+                <a:cs typeface="Segoe UI" panose="020B0502040204020203" pitchFamily="34" charset="0"/>
+              </a:rPr>
+              <a:t>MLOps</a:t>
+            </a:r>
+            <a:r>
+              <a:rPr lang="en-US" sz="4900" dirty="0">
+                <a:solidFill>
+                  <a:schemeClr val="tx1"/>
+                </a:solidFill>
+                <a:cs typeface="Segoe UI" panose="020B0502040204020203" pitchFamily="34" charset="0"/>
+              </a:rPr>
+              <a:t> (5)</a:t>
+            </a:r>
+            <a:br>
+              <a:rPr lang="en-US" dirty="0">
+                <a:solidFill>
+                  <a:schemeClr val="tx1"/>
+                </a:solidFill>
+                <a:latin typeface="Segoe UI" panose="020B0502040204020203" pitchFamily="34" charset="0"/>
+              </a:rPr>
+            </a:br>
+            <a:endParaRPr lang="en-US" sz="3236" dirty="0">
+              <a:solidFill>
+                <a:schemeClr val="tx1"/>
+              </a:solidFill>
+              <a:latin typeface="Segoe UI" panose="020B0502040204020203" pitchFamily="34" charset="0"/>
+            </a:endParaRPr>
+          </a:p>
+        </p:txBody>
+      </p:sp>
+      <p:sp>
+        <p:nvSpPr>
           <p:cNvPr id="3" name="Content Placeholder 2"/>
           <p:cNvSpPr>
             <a:spLocks noGrp="1"/>
@@ -18498,67 +18559,6 @@
               <a:solidFill>
                 <a:schemeClr val="tx1"/>
               </a:solidFill>
-            </a:endParaRPr>
-          </a:p>
-        </p:txBody>
-      </p:sp>
-      <p:sp>
-        <p:nvSpPr>
-          <p:cNvPr id="2" name="Title 1"/>
-          <p:cNvSpPr>
-            <a:spLocks noGrp="1"/>
-          </p:cNvSpPr>
-          <p:nvPr>
-            <p:ph type="title"/>
-          </p:nvPr>
-        </p:nvSpPr>
-        <p:spPr/>
-        <p:txBody>
-          <a:bodyPr>
-            <a:normAutofit fontScale="90000"/>
-          </a:bodyPr>
-          <a:lstStyle/>
-          <a:p>
-            <a:r>
-              <a:rPr lang="en-US" sz="4900" dirty="0">
-                <a:solidFill>
-                  <a:schemeClr val="tx1"/>
-                </a:solidFill>
-                <a:cs typeface="Segoe UI" panose="020B0502040204020203" pitchFamily="34" charset="0"/>
-              </a:rPr>
-              <a:t>Preferred solution – </a:t>
-            </a:r>
-            <a:r>
-              <a:rPr lang="en-US" sz="4900" dirty="0" err="1">
-                <a:solidFill>
-                  <a:schemeClr val="tx1"/>
-                </a:solidFill>
-                <a:cs typeface="Segoe UI" panose="020B0502040204020203" pitchFamily="34" charset="0"/>
-              </a:rPr>
-              <a:t>MLOps</a:t>
-            </a:r>
-            <a:r>
-              <a:rPr lang="en-US" sz="4900" dirty="0">
-                <a:solidFill>
-                  <a:schemeClr val="tx1"/>
-                </a:solidFill>
-                <a:cs typeface="Segoe UI" panose="020B0502040204020203" pitchFamily="34" charset="0"/>
-              </a:rPr>
-              <a:t> (5)</a:t>
-            </a:r>
-            <a:br>
-              <a:rPr lang="en-US" dirty="0">
-                <a:solidFill>
-                  <a:schemeClr val="tx1"/>
-                </a:solidFill>
-                <a:latin typeface="Segoe UI" panose="020B0502040204020203" pitchFamily="34" charset="0"/>
-              </a:rPr>
-            </a:br>
-            <a:endParaRPr lang="en-US" sz="3236" dirty="0">
-              <a:solidFill>
-                <a:schemeClr val="tx1"/>
-              </a:solidFill>
-              <a:latin typeface="Segoe UI" panose="020B0502040204020203" pitchFamily="34" charset="0"/>
             </a:endParaRPr>
           </a:p>
         </p:txBody>
@@ -18603,6 +18603,67 @@
       </p:grpSpPr>
       <p:sp>
         <p:nvSpPr>
+          <p:cNvPr id="2" name="Title 1"/>
+          <p:cNvSpPr>
+            <a:spLocks noGrp="1"/>
+          </p:cNvSpPr>
+          <p:nvPr>
+            <p:ph type="title"/>
+          </p:nvPr>
+        </p:nvSpPr>
+        <p:spPr/>
+        <p:txBody>
+          <a:bodyPr>
+            <a:normAutofit fontScale="90000"/>
+          </a:bodyPr>
+          <a:lstStyle/>
+          <a:p>
+            <a:r>
+              <a:rPr lang="en-US" sz="4900" dirty="0">
+                <a:solidFill>
+                  <a:schemeClr val="tx1"/>
+                </a:solidFill>
+                <a:cs typeface="Segoe UI" panose="020B0502040204020203" pitchFamily="34" charset="0"/>
+              </a:rPr>
+              <a:t>Preferred solution – </a:t>
+            </a:r>
+            <a:r>
+              <a:rPr lang="en-US" sz="4900" dirty="0" err="1">
+                <a:solidFill>
+                  <a:schemeClr val="tx1"/>
+                </a:solidFill>
+                <a:cs typeface="Segoe UI" panose="020B0502040204020203" pitchFamily="34" charset="0"/>
+              </a:rPr>
+              <a:t>MLOps</a:t>
+            </a:r>
+            <a:r>
+              <a:rPr lang="en-US" sz="4900" dirty="0">
+                <a:solidFill>
+                  <a:schemeClr val="tx1"/>
+                </a:solidFill>
+                <a:cs typeface="Segoe UI" panose="020B0502040204020203" pitchFamily="34" charset="0"/>
+              </a:rPr>
+              <a:t> (6)</a:t>
+            </a:r>
+            <a:br>
+              <a:rPr lang="en-US" dirty="0">
+                <a:solidFill>
+                  <a:schemeClr val="tx1"/>
+                </a:solidFill>
+                <a:latin typeface="Segoe UI" panose="020B0502040204020203" pitchFamily="34" charset="0"/>
+              </a:rPr>
+            </a:br>
+            <a:endParaRPr lang="en-US" sz="3236" dirty="0">
+              <a:solidFill>
+                <a:schemeClr val="tx1"/>
+              </a:solidFill>
+              <a:latin typeface="Segoe UI" panose="020B0502040204020203" pitchFamily="34" charset="0"/>
+            </a:endParaRPr>
+          </a:p>
+        </p:txBody>
+      </p:sp>
+      <p:sp>
+        <p:nvSpPr>
           <p:cNvPr id="3" name="Content Placeholder 2"/>
           <p:cNvSpPr>
             <a:spLocks noGrp="1"/>
@@ -18706,67 +18767,6 @@
               <a:solidFill>
                 <a:schemeClr val="tx1"/>
               </a:solidFill>
-            </a:endParaRPr>
-          </a:p>
-        </p:txBody>
-      </p:sp>
-      <p:sp>
-        <p:nvSpPr>
-          <p:cNvPr id="2" name="Title 1"/>
-          <p:cNvSpPr>
-            <a:spLocks noGrp="1"/>
-          </p:cNvSpPr>
-          <p:nvPr>
-            <p:ph type="title"/>
-          </p:nvPr>
-        </p:nvSpPr>
-        <p:spPr/>
-        <p:txBody>
-          <a:bodyPr>
-            <a:normAutofit fontScale="90000"/>
-          </a:bodyPr>
-          <a:lstStyle/>
-          <a:p>
-            <a:r>
-              <a:rPr lang="en-US" sz="4900" dirty="0">
-                <a:solidFill>
-                  <a:schemeClr val="tx1"/>
-                </a:solidFill>
-                <a:cs typeface="Segoe UI" panose="020B0502040204020203" pitchFamily="34" charset="0"/>
-              </a:rPr>
-              <a:t>Preferred solution – </a:t>
-            </a:r>
-            <a:r>
-              <a:rPr lang="en-US" sz="4900" dirty="0" err="1">
-                <a:solidFill>
-                  <a:schemeClr val="tx1"/>
-                </a:solidFill>
-                <a:cs typeface="Segoe UI" panose="020B0502040204020203" pitchFamily="34" charset="0"/>
-              </a:rPr>
-              <a:t>MLOps</a:t>
-            </a:r>
-            <a:r>
-              <a:rPr lang="en-US" sz="4900" dirty="0">
-                <a:solidFill>
-                  <a:schemeClr val="tx1"/>
-                </a:solidFill>
-                <a:cs typeface="Segoe UI" panose="020B0502040204020203" pitchFamily="34" charset="0"/>
-              </a:rPr>
-              <a:t> (6)</a:t>
-            </a:r>
-            <a:br>
-              <a:rPr lang="en-US" dirty="0">
-                <a:solidFill>
-                  <a:schemeClr val="tx1"/>
-                </a:solidFill>
-                <a:latin typeface="Segoe UI" panose="020B0502040204020203" pitchFamily="34" charset="0"/>
-              </a:rPr>
-            </a:br>
-            <a:endParaRPr lang="en-US" sz="3236" dirty="0">
-              <a:solidFill>
-                <a:schemeClr val="tx1"/>
-              </a:solidFill>
-              <a:latin typeface="Segoe UI" panose="020B0502040204020203" pitchFamily="34" charset="0"/>
             </a:endParaRPr>
           </a:p>
         </p:txBody>
@@ -18811,6 +18811,49 @@
       </p:grpSpPr>
       <p:sp>
         <p:nvSpPr>
+          <p:cNvPr id="2" name="Title 1"/>
+          <p:cNvSpPr>
+            <a:spLocks noGrp="1"/>
+          </p:cNvSpPr>
+          <p:nvPr>
+            <p:ph type="title"/>
+          </p:nvPr>
+        </p:nvSpPr>
+        <p:spPr/>
+        <p:txBody>
+          <a:bodyPr>
+            <a:normAutofit fontScale="90000"/>
+          </a:bodyPr>
+          <a:lstStyle/>
+          <a:p>
+            <a:r>
+              <a:rPr lang="en-US" sz="4900" dirty="0">
+                <a:solidFill>
+                  <a:schemeClr val="tx1"/>
+                </a:solidFill>
+                <a:cs typeface="Segoe UI" panose="020B0502040204020203" pitchFamily="34" charset="0"/>
+              </a:rPr>
+              <a:t>Preferred solution – monitoring (1)</a:t>
+            </a:r>
+            <a:br>
+              <a:rPr lang="en-US" dirty="0">
+                <a:solidFill>
+                  <a:schemeClr val="tx1"/>
+                </a:solidFill>
+                <a:latin typeface="Segoe UI" panose="020B0502040204020203" pitchFamily="34" charset="0"/>
+              </a:rPr>
+            </a:br>
+            <a:endParaRPr lang="en-US" sz="3236" dirty="0">
+              <a:solidFill>
+                <a:schemeClr val="tx1"/>
+              </a:solidFill>
+              <a:latin typeface="Segoe UI" panose="020B0502040204020203" pitchFamily="34" charset="0"/>
+            </a:endParaRPr>
+          </a:p>
+        </p:txBody>
+      </p:sp>
+      <p:sp>
+        <p:nvSpPr>
           <p:cNvPr id="3" name="Content Placeholder 2"/>
           <p:cNvSpPr>
             <a:spLocks noGrp="1"/>
@@ -18917,49 +18960,6 @@
               <a:solidFill>
                 <a:schemeClr val="tx1"/>
               </a:solidFill>
-            </a:endParaRPr>
-          </a:p>
-        </p:txBody>
-      </p:sp>
-      <p:sp>
-        <p:nvSpPr>
-          <p:cNvPr id="2" name="Title 1"/>
-          <p:cNvSpPr>
-            <a:spLocks noGrp="1"/>
-          </p:cNvSpPr>
-          <p:nvPr>
-            <p:ph type="title"/>
-          </p:nvPr>
-        </p:nvSpPr>
-        <p:spPr/>
-        <p:txBody>
-          <a:bodyPr>
-            <a:normAutofit fontScale="90000"/>
-          </a:bodyPr>
-          <a:lstStyle/>
-          <a:p>
-            <a:r>
-              <a:rPr lang="en-US" sz="4900" dirty="0">
-                <a:solidFill>
-                  <a:schemeClr val="tx1"/>
-                </a:solidFill>
-                <a:cs typeface="Segoe UI" panose="020B0502040204020203" pitchFamily="34" charset="0"/>
-              </a:rPr>
-              <a:t>Preferred solution – monitoring (1)</a:t>
-            </a:r>
-            <a:br>
-              <a:rPr lang="en-US" dirty="0">
-                <a:solidFill>
-                  <a:schemeClr val="tx1"/>
-                </a:solidFill>
-                <a:latin typeface="Segoe UI" panose="020B0502040204020203" pitchFamily="34" charset="0"/>
-              </a:rPr>
-            </a:br>
-            <a:endParaRPr lang="en-US" sz="3236" dirty="0">
-              <a:solidFill>
-                <a:schemeClr val="tx1"/>
-              </a:solidFill>
-              <a:latin typeface="Segoe UI" panose="020B0502040204020203" pitchFamily="34" charset="0"/>
             </a:endParaRPr>
           </a:p>
         </p:txBody>
@@ -19004,6 +19004,49 @@
       </p:grpSpPr>
       <p:sp>
         <p:nvSpPr>
+          <p:cNvPr id="2" name="Title 1"/>
+          <p:cNvSpPr>
+            <a:spLocks noGrp="1"/>
+          </p:cNvSpPr>
+          <p:nvPr>
+            <p:ph type="title"/>
+          </p:nvPr>
+        </p:nvSpPr>
+        <p:spPr/>
+        <p:txBody>
+          <a:bodyPr>
+            <a:normAutofit fontScale="90000"/>
+          </a:bodyPr>
+          <a:lstStyle/>
+          <a:p>
+            <a:r>
+              <a:rPr lang="en-US" sz="4900" dirty="0">
+                <a:solidFill>
+                  <a:schemeClr val="tx1"/>
+                </a:solidFill>
+                <a:cs typeface="Segoe UI" panose="020B0502040204020203" pitchFamily="34" charset="0"/>
+              </a:rPr>
+              <a:t>Preferred solution – monitoring (2)</a:t>
+            </a:r>
+            <a:br>
+              <a:rPr lang="en-US" dirty="0">
+                <a:solidFill>
+                  <a:schemeClr val="tx1"/>
+                </a:solidFill>
+                <a:latin typeface="Segoe UI" panose="020B0502040204020203" pitchFamily="34" charset="0"/>
+              </a:rPr>
+            </a:br>
+            <a:endParaRPr lang="en-US" sz="3236" dirty="0">
+              <a:solidFill>
+                <a:schemeClr val="tx1"/>
+              </a:solidFill>
+              <a:latin typeface="Segoe UI" panose="020B0502040204020203" pitchFamily="34" charset="0"/>
+            </a:endParaRPr>
+          </a:p>
+        </p:txBody>
+      </p:sp>
+      <p:sp>
+        <p:nvSpPr>
           <p:cNvPr id="3" name="Content Placeholder 2"/>
           <p:cNvSpPr>
             <a:spLocks noGrp="1"/>
@@ -19128,49 +19171,6 @@
               <a:solidFill>
                 <a:schemeClr val="tx1"/>
               </a:solidFill>
-            </a:endParaRPr>
-          </a:p>
-        </p:txBody>
-      </p:sp>
-      <p:sp>
-        <p:nvSpPr>
-          <p:cNvPr id="2" name="Title 1"/>
-          <p:cNvSpPr>
-            <a:spLocks noGrp="1"/>
-          </p:cNvSpPr>
-          <p:nvPr>
-            <p:ph type="title"/>
-          </p:nvPr>
-        </p:nvSpPr>
-        <p:spPr/>
-        <p:txBody>
-          <a:bodyPr>
-            <a:normAutofit fontScale="90000"/>
-          </a:bodyPr>
-          <a:lstStyle/>
-          <a:p>
-            <a:r>
-              <a:rPr lang="en-US" sz="4900" dirty="0">
-                <a:solidFill>
-                  <a:schemeClr val="tx1"/>
-                </a:solidFill>
-                <a:cs typeface="Segoe UI" panose="020B0502040204020203" pitchFamily="34" charset="0"/>
-              </a:rPr>
-              <a:t>Preferred solution – monitoring (2)</a:t>
-            </a:r>
-            <a:br>
-              <a:rPr lang="en-US" dirty="0">
-                <a:solidFill>
-                  <a:schemeClr val="tx1"/>
-                </a:solidFill>
-                <a:latin typeface="Segoe UI" panose="020B0502040204020203" pitchFamily="34" charset="0"/>
-              </a:rPr>
-            </a:br>
-            <a:endParaRPr lang="en-US" sz="3236" dirty="0">
-              <a:solidFill>
-                <a:schemeClr val="tx1"/>
-              </a:solidFill>
-              <a:latin typeface="Segoe UI" panose="020B0502040204020203" pitchFamily="34" charset="0"/>
             </a:endParaRPr>
           </a:p>
         </p:txBody>
@@ -19215,6 +19215,49 @@
       </p:grpSpPr>
       <p:sp>
         <p:nvSpPr>
+          <p:cNvPr id="2" name="Title 1"/>
+          <p:cNvSpPr>
+            <a:spLocks noGrp="1"/>
+          </p:cNvSpPr>
+          <p:nvPr>
+            <p:ph type="title"/>
+          </p:nvPr>
+        </p:nvSpPr>
+        <p:spPr/>
+        <p:txBody>
+          <a:bodyPr>
+            <a:normAutofit fontScale="90000"/>
+          </a:bodyPr>
+          <a:lstStyle/>
+          <a:p>
+            <a:r>
+              <a:rPr lang="en-US" sz="4900" dirty="0">
+                <a:solidFill>
+                  <a:schemeClr val="tx1"/>
+                </a:solidFill>
+                <a:cs typeface="Segoe UI" panose="020B0502040204020203" pitchFamily="34" charset="0"/>
+              </a:rPr>
+              <a:t>Preferred objections handling</a:t>
+            </a:r>
+            <a:br>
+              <a:rPr lang="en-US" dirty="0">
+                <a:solidFill>
+                  <a:schemeClr val="tx1"/>
+                </a:solidFill>
+                <a:latin typeface="Segoe UI" panose="020B0502040204020203" pitchFamily="34" charset="0"/>
+              </a:rPr>
+            </a:br>
+            <a:endParaRPr lang="en-US" sz="3236" dirty="0">
+              <a:solidFill>
+                <a:schemeClr val="tx1"/>
+              </a:solidFill>
+              <a:latin typeface="Segoe UI" panose="020B0502040204020203" pitchFamily="34" charset="0"/>
+            </a:endParaRPr>
+          </a:p>
+        </p:txBody>
+      </p:sp>
+      <p:sp>
+        <p:nvSpPr>
           <p:cNvPr id="3" name="Content Placeholder 2"/>
           <p:cNvSpPr>
             <a:spLocks noGrp="1"/>
@@ -19289,49 +19332,6 @@
               </a:rPr>
               <a:t>Because ONNX effectively re-compiles a model when converting to the ONNX format, it may provide some optimizations that improve the scoring performance. In some tests, improvements of 2x on average in the time taken to inference were experienced. </a:t>
             </a:r>
-          </a:p>
-        </p:txBody>
-      </p:sp>
-      <p:sp>
-        <p:nvSpPr>
-          <p:cNvPr id="2" name="Title 1"/>
-          <p:cNvSpPr>
-            <a:spLocks noGrp="1"/>
-          </p:cNvSpPr>
-          <p:nvPr>
-            <p:ph type="title"/>
-          </p:nvPr>
-        </p:nvSpPr>
-        <p:spPr/>
-        <p:txBody>
-          <a:bodyPr>
-            <a:normAutofit fontScale="90000"/>
-          </a:bodyPr>
-          <a:lstStyle/>
-          <a:p>
-            <a:r>
-              <a:rPr lang="en-US" sz="4900" dirty="0">
-                <a:solidFill>
-                  <a:schemeClr val="tx1"/>
-                </a:solidFill>
-                <a:cs typeface="Segoe UI" panose="020B0502040204020203" pitchFamily="34" charset="0"/>
-              </a:rPr>
-              <a:t>Preferred objections handling</a:t>
-            </a:r>
-            <a:br>
-              <a:rPr lang="en-US" dirty="0">
-                <a:solidFill>
-                  <a:schemeClr val="tx1"/>
-                </a:solidFill>
-                <a:latin typeface="Segoe UI" panose="020B0502040204020203" pitchFamily="34" charset="0"/>
-              </a:rPr>
-            </a:br>
-            <a:endParaRPr lang="en-US" sz="3236" dirty="0">
-              <a:solidFill>
-                <a:schemeClr val="tx1"/>
-              </a:solidFill>
-              <a:latin typeface="Segoe UI" panose="020B0502040204020203" pitchFamily="34" charset="0"/>
-            </a:endParaRPr>
           </a:p>
         </p:txBody>
       </p:sp>
@@ -19375,6 +19375,49 @@
       </p:grpSpPr>
       <p:sp>
         <p:nvSpPr>
+          <p:cNvPr id="2" name="Title 1"/>
+          <p:cNvSpPr>
+            <a:spLocks noGrp="1"/>
+          </p:cNvSpPr>
+          <p:nvPr>
+            <p:ph type="title"/>
+          </p:nvPr>
+        </p:nvSpPr>
+        <p:spPr/>
+        <p:txBody>
+          <a:bodyPr>
+            <a:normAutofit fontScale="90000"/>
+          </a:bodyPr>
+          <a:lstStyle/>
+          <a:p>
+            <a:r>
+              <a:rPr lang="en-US" sz="4900" dirty="0">
+                <a:solidFill>
+                  <a:schemeClr val="tx1"/>
+                </a:solidFill>
+                <a:cs typeface="Segoe UI" panose="020B0502040204020203" pitchFamily="34" charset="0"/>
+              </a:rPr>
+              <a:t>Preferred objections handling - continued</a:t>
+            </a:r>
+            <a:br>
+              <a:rPr lang="en-US" dirty="0">
+                <a:solidFill>
+                  <a:schemeClr val="tx1"/>
+                </a:solidFill>
+                <a:latin typeface="Segoe UI" panose="020B0502040204020203" pitchFamily="34" charset="0"/>
+              </a:rPr>
+            </a:br>
+            <a:endParaRPr lang="en-US" sz="3236" dirty="0">
+              <a:solidFill>
+                <a:schemeClr val="tx1"/>
+              </a:solidFill>
+              <a:latin typeface="Segoe UI" panose="020B0502040204020203" pitchFamily="34" charset="0"/>
+            </a:endParaRPr>
+          </a:p>
+        </p:txBody>
+      </p:sp>
+      <p:sp>
+        <p:nvSpPr>
           <p:cNvPr id="3" name="Content Placeholder 2"/>
           <p:cNvSpPr>
             <a:spLocks noGrp="1"/>
@@ -19475,49 +19518,6 @@
               </a:rPr>
               <a:t>You can create release pipelines that include pre-approvals that require a person to approve a release before it is deployed into production.</a:t>
             </a:r>
-          </a:p>
-        </p:txBody>
-      </p:sp>
-      <p:sp>
-        <p:nvSpPr>
-          <p:cNvPr id="2" name="Title 1"/>
-          <p:cNvSpPr>
-            <a:spLocks noGrp="1"/>
-          </p:cNvSpPr>
-          <p:nvPr>
-            <p:ph type="title"/>
-          </p:nvPr>
-        </p:nvSpPr>
-        <p:spPr/>
-        <p:txBody>
-          <a:bodyPr>
-            <a:normAutofit fontScale="90000"/>
-          </a:bodyPr>
-          <a:lstStyle/>
-          <a:p>
-            <a:r>
-              <a:rPr lang="en-US" sz="4900" dirty="0">
-                <a:solidFill>
-                  <a:schemeClr val="tx1"/>
-                </a:solidFill>
-                <a:cs typeface="Segoe UI" panose="020B0502040204020203" pitchFamily="34" charset="0"/>
-              </a:rPr>
-              <a:t>Preferred objections handling - continued</a:t>
-            </a:r>
-            <a:br>
-              <a:rPr lang="en-US" dirty="0">
-                <a:solidFill>
-                  <a:schemeClr val="tx1"/>
-                </a:solidFill>
-                <a:latin typeface="Segoe UI" panose="020B0502040204020203" pitchFamily="34" charset="0"/>
-              </a:rPr>
-            </a:br>
-            <a:endParaRPr lang="en-US" sz="3236" dirty="0">
-              <a:solidFill>
-                <a:schemeClr val="tx1"/>
-              </a:solidFill>
-              <a:latin typeface="Segoe UI" panose="020B0502040204020203" pitchFamily="34" charset="0"/>
-            </a:endParaRPr>
           </a:p>
         </p:txBody>
       </p:sp>
@@ -19561,6 +19561,49 @@
       </p:grpSpPr>
       <p:sp>
         <p:nvSpPr>
+          <p:cNvPr id="2" name="Title 1"/>
+          <p:cNvSpPr>
+            <a:spLocks noGrp="1"/>
+          </p:cNvSpPr>
+          <p:nvPr>
+            <p:ph type="title"/>
+          </p:nvPr>
+        </p:nvSpPr>
+        <p:spPr/>
+        <p:txBody>
+          <a:bodyPr>
+            <a:normAutofit fontScale="90000"/>
+          </a:bodyPr>
+          <a:lstStyle/>
+          <a:p>
+            <a:r>
+              <a:rPr lang="en-US" sz="4900" dirty="0">
+                <a:solidFill>
+                  <a:schemeClr val="tx1"/>
+                </a:solidFill>
+                <a:cs typeface="Segoe UI" panose="020B0502040204020203" pitchFamily="34" charset="0"/>
+              </a:rPr>
+              <a:t>Customer quote</a:t>
+            </a:r>
+            <a:br>
+              <a:rPr lang="en-US" dirty="0">
+                <a:solidFill>
+                  <a:schemeClr val="tx1"/>
+                </a:solidFill>
+                <a:latin typeface="Segoe UI" panose="020B0502040204020203" pitchFamily="34" charset="0"/>
+              </a:rPr>
+            </a:br>
+            <a:endParaRPr lang="en-US" sz="3236" dirty="0">
+              <a:solidFill>
+                <a:schemeClr val="tx1"/>
+              </a:solidFill>
+              <a:latin typeface="Segoe UI" panose="020B0502040204020203" pitchFamily="34" charset="0"/>
+            </a:endParaRPr>
+          </a:p>
+        </p:txBody>
+      </p:sp>
+      <p:sp>
+        <p:nvSpPr>
           <p:cNvPr id="3" name="Content Placeholder 2"/>
           <p:cNvSpPr>
             <a:spLocks noGrp="1"/>
@@ -19627,49 +19670,6 @@
               <a:solidFill>
                 <a:schemeClr val="tx1"/>
               </a:solidFill>
-            </a:endParaRPr>
-          </a:p>
-        </p:txBody>
-      </p:sp>
-      <p:sp>
-        <p:nvSpPr>
-          <p:cNvPr id="2" name="Title 1"/>
-          <p:cNvSpPr>
-            <a:spLocks noGrp="1"/>
-          </p:cNvSpPr>
-          <p:nvPr>
-            <p:ph type="title"/>
-          </p:nvPr>
-        </p:nvSpPr>
-        <p:spPr/>
-        <p:txBody>
-          <a:bodyPr>
-            <a:normAutofit fontScale="90000"/>
-          </a:bodyPr>
-          <a:lstStyle/>
-          <a:p>
-            <a:r>
-              <a:rPr lang="en-US" sz="4900" dirty="0">
-                <a:solidFill>
-                  <a:schemeClr val="tx1"/>
-                </a:solidFill>
-                <a:cs typeface="Segoe UI" panose="020B0502040204020203" pitchFamily="34" charset="0"/>
-              </a:rPr>
-              <a:t>Customer quote</a:t>
-            </a:r>
-            <a:br>
-              <a:rPr lang="en-US" dirty="0">
-                <a:solidFill>
-                  <a:schemeClr val="tx1"/>
-                </a:solidFill>
-                <a:latin typeface="Segoe UI" panose="020B0502040204020203" pitchFamily="34" charset="0"/>
-              </a:rPr>
-            </a:br>
-            <a:endParaRPr lang="en-US" sz="3236" dirty="0">
-              <a:solidFill>
-                <a:schemeClr val="tx1"/>
-              </a:solidFill>
-              <a:latin typeface="Segoe UI" panose="020B0502040204020203" pitchFamily="34" charset="0"/>
             </a:endParaRPr>
           </a:p>
         </p:txBody>
@@ -19722,6 +19722,36 @@
       </p:grpSpPr>
       <p:sp>
         <p:nvSpPr>
+          <p:cNvPr id="2" name="Title 1"/>
+          <p:cNvSpPr>
+            <a:spLocks noGrp="1"/>
+          </p:cNvSpPr>
+          <p:nvPr>
+            <p:ph type="title"/>
+          </p:nvPr>
+        </p:nvSpPr>
+        <p:spPr/>
+        <p:txBody>
+          <a:bodyPr>
+            <a:normAutofit/>
+          </a:bodyPr>
+          <a:lstStyle/>
+          <a:p>
+            <a:r>
+              <a:rPr lang="en-US" sz="4400" dirty="0">
+                <a:solidFill>
+                  <a:schemeClr val="tx1"/>
+                </a:solidFill>
+                <a:latin typeface="Segoe UI Light" panose="020B0502040204020203" pitchFamily="34" charset="0"/>
+                <a:cs typeface="Segoe UI Light" panose="020B0502040204020203" pitchFamily="34" charset="0"/>
+              </a:rPr>
+              <a:t>Step 1: Review the customer case study</a:t>
+            </a:r>
+          </a:p>
+        </p:txBody>
+      </p:sp>
+      <p:sp>
+        <p:nvSpPr>
           <p:cNvPr id="9" name="TextBox 8">
             <a:extLst>
               <a:ext uri="{FF2B5EF4-FFF2-40B4-BE49-F238E27FC236}">
@@ -19822,36 +19852,6 @@
                 <a:cs typeface="Segoe UI Semilight" panose="020B0402040204020203" pitchFamily="34" charset="0"/>
               </a:rPr>
               <a:t>15 minutes</a:t>
-            </a:r>
-          </a:p>
-        </p:txBody>
-      </p:sp>
-      <p:sp>
-        <p:nvSpPr>
-          <p:cNvPr id="2" name="Title 1"/>
-          <p:cNvSpPr>
-            <a:spLocks noGrp="1"/>
-          </p:cNvSpPr>
-          <p:nvPr>
-            <p:ph type="title"/>
-          </p:nvPr>
-        </p:nvSpPr>
-        <p:spPr/>
-        <p:txBody>
-          <a:bodyPr>
-            <a:normAutofit/>
-          </a:bodyPr>
-          <a:lstStyle/>
-          <a:p>
-            <a:r>
-              <a:rPr lang="en-US" sz="4400" dirty="0">
-                <a:solidFill>
-                  <a:schemeClr val="tx1"/>
-                </a:solidFill>
-                <a:latin typeface="Segoe UI Light" panose="020B0502040204020203" pitchFamily="34" charset="0"/>
-                <a:cs typeface="Segoe UI Light" panose="020B0502040204020203" pitchFamily="34" charset="0"/>
-              </a:rPr>
-              <a:t>Step 1: Review the customer case study</a:t>
             </a:r>
           </a:p>
         </p:txBody>
@@ -19894,6 +19894,112 @@
           <a:chExt cx="0" cy="0"/>
         </a:xfrm>
       </p:grpSpPr>
+      <p:sp>
+        <p:nvSpPr>
+          <p:cNvPr id="2" name="Title 1"/>
+          <p:cNvSpPr>
+            <a:spLocks noGrp="1"/>
+          </p:cNvSpPr>
+          <p:nvPr>
+            <p:ph type="title"/>
+          </p:nvPr>
+        </p:nvSpPr>
+        <p:spPr/>
+        <p:txBody>
+          <a:bodyPr>
+            <a:normAutofit fontScale="90000"/>
+          </a:bodyPr>
+          <a:lstStyle/>
+          <a:p>
+            <a:r>
+              <a:rPr lang="en-US" sz="4900" dirty="0">
+                <a:solidFill>
+                  <a:schemeClr val="tx1"/>
+                </a:solidFill>
+                <a:cs typeface="Segoe UI" panose="020B0502040204020203" pitchFamily="34" charset="0"/>
+              </a:rPr>
+              <a:t>Customer situation - introduction</a:t>
+            </a:r>
+            <a:br>
+              <a:rPr lang="en-US" dirty="0">
+                <a:solidFill>
+                  <a:schemeClr val="tx1"/>
+                </a:solidFill>
+                <a:latin typeface="Segoe UI" panose="020B0502040204020203" pitchFamily="34" charset="0"/>
+              </a:rPr>
+            </a:br>
+            <a:endParaRPr lang="en-US" sz="3236" dirty="0">
+              <a:solidFill>
+                <a:schemeClr val="tx1"/>
+              </a:solidFill>
+              <a:latin typeface="Segoe UI" panose="020B0502040204020203" pitchFamily="34" charset="0"/>
+            </a:endParaRPr>
+          </a:p>
+        </p:txBody>
+      </p:sp>
+      <p:sp>
+        <p:nvSpPr>
+          <p:cNvPr id="3" name="Content Placeholder 2"/>
+          <p:cNvSpPr>
+            <a:spLocks noGrp="1"/>
+          </p:cNvSpPr>
+          <p:nvPr>
+            <p:ph type="body" sz="quarter" idx="10"/>
+          </p:nvPr>
+        </p:nvSpPr>
+        <p:spPr>
+          <a:xfrm>
+            <a:off x="269239" y="1189177"/>
+            <a:ext cx="8675469" cy="5192168"/>
+          </a:xfrm>
+        </p:spPr>
+        <p:txBody>
+          <a:bodyPr>
+            <a:noAutofit/>
+          </a:bodyPr>
+          <a:lstStyle/>
+          <a:p>
+            <a:r>
+              <a:rPr lang="en-US" sz="2400" dirty="0"/>
+              <a:t>Trey Research Inc. delivers innovative solutions for manufacturers.</a:t>
+            </a:r>
+          </a:p>
+          <a:p>
+            <a:r>
+              <a:rPr lang="en-US" sz="2400" dirty="0"/>
+              <a:t>They specialize in identifying and solving problems for manufacturers that can run the range from automating away mundane but time-intensive processes to delivering cutting edge approaches that provide new opportunities for their manufacturing clients. </a:t>
+            </a:r>
+          </a:p>
+          <a:p>
+            <a:r>
+              <a:rPr lang="en-US" sz="2400" dirty="0"/>
+              <a:t>Trey Research has decades specializing in data science and application development that until now were separate units. </a:t>
+            </a:r>
+          </a:p>
+          <a:p>
+            <a:r>
+              <a:rPr lang="en-US" sz="2400" dirty="0"/>
+              <a:t>They have seen the value created by the ad-hoc synergies between data science and app development, but they would like to unlock the greater, long term value as they formalize their approach by combining the two units into one and follow one standardized process for operationalizing their innovations.</a:t>
+            </a:r>
+          </a:p>
+          <a:p>
+            <a:endParaRPr lang="en-US" sz="2400" dirty="0"/>
+          </a:p>
+          <a:p>
+            <a:pPr marL="0" indent="0">
+              <a:spcAft>
+                <a:spcPts val="882"/>
+              </a:spcAft>
+              <a:buNone/>
+            </a:pPr>
+            <a:endParaRPr lang="en-US" sz="2400" dirty="0">
+              <a:solidFill>
+                <a:schemeClr val="tx1"/>
+              </a:solidFill>
+            </a:endParaRPr>
+          </a:p>
+        </p:txBody>
+      </p:sp>
       <p:pic>
         <p:nvPicPr>
           <p:cNvPr id="5" name="Graphic 4" descr="Boardroom meeting">
@@ -19933,112 +20039,6 @@
           </a:prstGeom>
         </p:spPr>
       </p:pic>
-      <p:sp>
-        <p:nvSpPr>
-          <p:cNvPr id="3" name="Content Placeholder 2"/>
-          <p:cNvSpPr>
-            <a:spLocks noGrp="1"/>
-          </p:cNvSpPr>
-          <p:nvPr>
-            <p:ph type="body" sz="quarter" idx="10"/>
-          </p:nvPr>
-        </p:nvSpPr>
-        <p:spPr>
-          <a:xfrm>
-            <a:off x="269239" y="1189177"/>
-            <a:ext cx="8675469" cy="5192168"/>
-          </a:xfrm>
-        </p:spPr>
-        <p:txBody>
-          <a:bodyPr>
-            <a:noAutofit/>
-          </a:bodyPr>
-          <a:lstStyle/>
-          <a:p>
-            <a:r>
-              <a:rPr lang="en-US" sz="2400" dirty="0"/>
-              <a:t>Trey Research Inc. delivers innovative solutions for manufacturers.</a:t>
-            </a:r>
-          </a:p>
-          <a:p>
-            <a:r>
-              <a:rPr lang="en-US" sz="2400" dirty="0"/>
-              <a:t>They specialize in identifying and solving problems for manufacturers that can run the range from automating away mundane but time-intensive processes to delivering cutting edge approaches that provide new opportunities for their manufacturing clients. </a:t>
-            </a:r>
-          </a:p>
-          <a:p>
-            <a:r>
-              <a:rPr lang="en-US" sz="2400" dirty="0"/>
-              <a:t>Trey Research has decades specializing in data science and application development that until now were separate units. </a:t>
-            </a:r>
-          </a:p>
-          <a:p>
-            <a:r>
-              <a:rPr lang="en-US" sz="2400" dirty="0"/>
-              <a:t>They have seen the value created by the ad-hoc synergies between data science and app development, but they would like to unlock the greater, long term value as they formalize their approach by combining the two units into one and follow one standardized process for operationalizing their innovations.</a:t>
-            </a:r>
-          </a:p>
-          <a:p>
-            <a:endParaRPr lang="en-US" sz="2400" dirty="0"/>
-          </a:p>
-          <a:p>
-            <a:pPr marL="0" indent="0">
-              <a:spcAft>
-                <a:spcPts val="882"/>
-              </a:spcAft>
-              <a:buNone/>
-            </a:pPr>
-            <a:endParaRPr lang="en-US" sz="2400" dirty="0">
-              <a:solidFill>
-                <a:schemeClr val="tx1"/>
-              </a:solidFill>
-            </a:endParaRPr>
-          </a:p>
-        </p:txBody>
-      </p:sp>
-      <p:sp>
-        <p:nvSpPr>
-          <p:cNvPr id="2" name="Title 1"/>
-          <p:cNvSpPr>
-            <a:spLocks noGrp="1"/>
-          </p:cNvSpPr>
-          <p:nvPr>
-            <p:ph type="title"/>
-          </p:nvPr>
-        </p:nvSpPr>
-        <p:spPr/>
-        <p:txBody>
-          <a:bodyPr>
-            <a:normAutofit fontScale="90000"/>
-          </a:bodyPr>
-          <a:lstStyle/>
-          <a:p>
-            <a:r>
-              <a:rPr lang="en-US" sz="4900" dirty="0">
-                <a:solidFill>
-                  <a:schemeClr val="tx1"/>
-                </a:solidFill>
-                <a:cs typeface="Segoe UI" panose="020B0502040204020203" pitchFamily="34" charset="0"/>
-              </a:rPr>
-              <a:t>Customer situation - introduction</a:t>
-            </a:r>
-            <a:br>
-              <a:rPr lang="en-US" dirty="0">
-                <a:solidFill>
-                  <a:schemeClr val="tx1"/>
-                </a:solidFill>
-                <a:latin typeface="Segoe UI" panose="020B0502040204020203" pitchFamily="34" charset="0"/>
-              </a:rPr>
-            </a:br>
-            <a:endParaRPr lang="en-US" sz="3236" dirty="0">
-              <a:solidFill>
-                <a:schemeClr val="tx1"/>
-              </a:solidFill>
-              <a:latin typeface="Segoe UI" panose="020B0502040204020203" pitchFamily="34" charset="0"/>
-            </a:endParaRPr>
-          </a:p>
-        </p:txBody>
-      </p:sp>
     </p:spTree>
     <p:extLst>
       <p:ext uri="{BB962C8B-B14F-4D97-AF65-F5344CB8AC3E}">
@@ -20077,6 +20077,54 @@
           <a:chExt cx="0" cy="0"/>
         </a:xfrm>
       </p:grpSpPr>
+      <p:sp>
+        <p:nvSpPr>
+          <p:cNvPr id="2" name="Title 1"/>
+          <p:cNvSpPr>
+            <a:spLocks noGrp="1"/>
+          </p:cNvSpPr>
+          <p:nvPr>
+            <p:ph type="title"/>
+          </p:nvPr>
+        </p:nvSpPr>
+        <p:spPr>
+          <a:xfrm>
+            <a:off x="269240" y="289511"/>
+            <a:ext cx="11655840" cy="899665"/>
+          </a:xfrm>
+        </p:spPr>
+        <p:txBody>
+          <a:bodyPr>
+            <a:normAutofit fontScale="90000"/>
+          </a:bodyPr>
+          <a:lstStyle/>
+          <a:p>
+            <a:r>
+              <a:rPr lang="en-US" sz="4900" dirty="0">
+                <a:solidFill>
+                  <a:schemeClr val="tx1"/>
+                </a:solidFill>
+                <a:cs typeface="Segoe UI" panose="020B0502040204020203" pitchFamily="34" charset="0"/>
+              </a:rPr>
+              <a:t>Customer situation - analysis</a:t>
+            </a:r>
+            <a:br>
+              <a:rPr lang="en-US" dirty="0">
+                <a:solidFill>
+                  <a:schemeClr val="tx1"/>
+                </a:solidFill>
+                <a:latin typeface="Segoe UI" panose="020B0502040204020203" pitchFamily="34" charset="0"/>
+              </a:rPr>
+            </a:br>
+            <a:endParaRPr lang="en-US" sz="3236" dirty="0">
+              <a:solidFill>
+                <a:schemeClr val="tx1"/>
+              </a:solidFill>
+              <a:latin typeface="Segoe UI" panose="020B0502040204020203" pitchFamily="34" charset="0"/>
+            </a:endParaRPr>
+          </a:p>
+        </p:txBody>
+      </p:sp>
       <p:grpSp>
         <p:nvGrpSpPr>
           <p:cNvPr id="4" name="Group 3" descr="Customer situation details investigation">
@@ -20236,54 +20284,6 @@
           </a:p>
         </p:txBody>
       </p:sp>
-      <p:sp>
-        <p:nvSpPr>
-          <p:cNvPr id="2" name="Title 1"/>
-          <p:cNvSpPr>
-            <a:spLocks noGrp="1"/>
-          </p:cNvSpPr>
-          <p:nvPr>
-            <p:ph type="title"/>
-          </p:nvPr>
-        </p:nvSpPr>
-        <p:spPr>
-          <a:xfrm>
-            <a:off x="269240" y="289511"/>
-            <a:ext cx="11655840" cy="899665"/>
-          </a:xfrm>
-        </p:spPr>
-        <p:txBody>
-          <a:bodyPr>
-            <a:normAutofit fontScale="90000"/>
-          </a:bodyPr>
-          <a:lstStyle/>
-          <a:p>
-            <a:r>
-              <a:rPr lang="en-US" sz="4900" dirty="0">
-                <a:solidFill>
-                  <a:schemeClr val="tx1"/>
-                </a:solidFill>
-                <a:cs typeface="Segoe UI" panose="020B0502040204020203" pitchFamily="34" charset="0"/>
-              </a:rPr>
-              <a:t>Customer situation - analysis</a:t>
-            </a:r>
-            <a:br>
-              <a:rPr lang="en-US" dirty="0">
-                <a:solidFill>
-                  <a:schemeClr val="tx1"/>
-                </a:solidFill>
-                <a:latin typeface="Segoe UI" panose="020B0502040204020203" pitchFamily="34" charset="0"/>
-              </a:rPr>
-            </a:br>
-            <a:endParaRPr lang="en-US" sz="3236" dirty="0">
-              <a:solidFill>
-                <a:schemeClr val="tx1"/>
-              </a:solidFill>
-              <a:latin typeface="Segoe UI" panose="020B0502040204020203" pitchFamily="34" charset="0"/>
-            </a:endParaRPr>
-          </a:p>
-        </p:txBody>
-      </p:sp>
     </p:spTree>
     <p:extLst>
       <p:ext uri="{BB962C8B-B14F-4D97-AF65-F5344CB8AC3E}">
@@ -20324,6 +20324,49 @@
       </p:grpSpPr>
       <p:sp>
         <p:nvSpPr>
+          <p:cNvPr id="2" name="Title 1"/>
+          <p:cNvSpPr>
+            <a:spLocks noGrp="1"/>
+          </p:cNvSpPr>
+          <p:nvPr>
+            <p:ph type="title"/>
+          </p:nvPr>
+        </p:nvSpPr>
+        <p:spPr/>
+        <p:txBody>
+          <a:bodyPr>
+            <a:normAutofit fontScale="90000"/>
+          </a:bodyPr>
+          <a:lstStyle/>
+          <a:p>
+            <a:r>
+              <a:rPr lang="en-US" sz="4900" dirty="0">
+                <a:solidFill>
+                  <a:schemeClr val="tx1"/>
+                </a:solidFill>
+                <a:cs typeface="Segoe UI" panose="020B0502040204020203" pitchFamily="34" charset="0"/>
+              </a:rPr>
+              <a:t>Customer situation - expectations</a:t>
+            </a:r>
+            <a:br>
+              <a:rPr lang="en-US" dirty="0">
+                <a:solidFill>
+                  <a:schemeClr val="tx1"/>
+                </a:solidFill>
+                <a:latin typeface="Segoe UI" panose="020B0502040204020203" pitchFamily="34" charset="0"/>
+              </a:rPr>
+            </a:br>
+            <a:endParaRPr lang="en-US" sz="3236" dirty="0">
+              <a:solidFill>
+                <a:schemeClr val="tx1"/>
+              </a:solidFill>
+              <a:latin typeface="Segoe UI" panose="020B0502040204020203" pitchFamily="34" charset="0"/>
+            </a:endParaRPr>
+          </a:p>
+        </p:txBody>
+      </p:sp>
+      <p:sp>
+        <p:nvSpPr>
           <p:cNvPr id="3" name="Content Placeholder 2"/>
           <p:cNvSpPr>
             <a:spLocks noGrp="1"/>
@@ -20364,49 +20407,6 @@
               <a:solidFill>
                 <a:schemeClr val="tx1"/>
               </a:solidFill>
-            </a:endParaRPr>
-          </a:p>
-        </p:txBody>
-      </p:sp>
-      <p:sp>
-        <p:nvSpPr>
-          <p:cNvPr id="2" name="Title 1"/>
-          <p:cNvSpPr>
-            <a:spLocks noGrp="1"/>
-          </p:cNvSpPr>
-          <p:nvPr>
-            <p:ph type="title"/>
-          </p:nvPr>
-        </p:nvSpPr>
-        <p:spPr/>
-        <p:txBody>
-          <a:bodyPr>
-            <a:normAutofit fontScale="90000"/>
-          </a:bodyPr>
-          <a:lstStyle/>
-          <a:p>
-            <a:r>
-              <a:rPr lang="en-US" sz="4900" dirty="0">
-                <a:solidFill>
-                  <a:schemeClr val="tx1"/>
-                </a:solidFill>
-                <a:cs typeface="Segoe UI" panose="020B0502040204020203" pitchFamily="34" charset="0"/>
-              </a:rPr>
-              <a:t>Customer situation - expectations</a:t>
-            </a:r>
-            <a:br>
-              <a:rPr lang="en-US" dirty="0">
-                <a:solidFill>
-                  <a:schemeClr val="tx1"/>
-                </a:solidFill>
-                <a:latin typeface="Segoe UI" panose="020B0502040204020203" pitchFamily="34" charset="0"/>
-              </a:rPr>
-            </a:br>
-            <a:endParaRPr lang="en-US" sz="3236" dirty="0">
-              <a:solidFill>
-                <a:schemeClr val="tx1"/>
-              </a:solidFill>
-              <a:latin typeface="Segoe UI" panose="020B0502040204020203" pitchFamily="34" charset="0"/>
             </a:endParaRPr>
           </a:p>
         </p:txBody>
@@ -20451,6 +20451,49 @@
       </p:grpSpPr>
       <p:sp>
         <p:nvSpPr>
+          <p:cNvPr id="2" name="Title 1"/>
+          <p:cNvSpPr>
+            <a:spLocks noGrp="1"/>
+          </p:cNvSpPr>
+          <p:nvPr>
+            <p:ph type="title"/>
+          </p:nvPr>
+        </p:nvSpPr>
+        <p:spPr/>
+        <p:txBody>
+          <a:bodyPr>
+            <a:normAutofit fontScale="90000"/>
+          </a:bodyPr>
+          <a:lstStyle/>
+          <a:p>
+            <a:r>
+              <a:rPr lang="en-US" sz="4900" dirty="0">
+                <a:solidFill>
+                  <a:schemeClr val="tx1"/>
+                </a:solidFill>
+                <a:cs typeface="Segoe UI" panose="020B0502040204020203" pitchFamily="34" charset="0"/>
+              </a:rPr>
+              <a:t>Customer needs</a:t>
+            </a:r>
+            <a:br>
+              <a:rPr lang="en-US" dirty="0">
+                <a:solidFill>
+                  <a:schemeClr val="tx1"/>
+                </a:solidFill>
+                <a:latin typeface="Segoe UI" panose="020B0502040204020203" pitchFamily="34" charset="0"/>
+              </a:rPr>
+            </a:br>
+            <a:endParaRPr lang="en-US" sz="3236" dirty="0">
+              <a:solidFill>
+                <a:schemeClr val="tx1"/>
+              </a:solidFill>
+              <a:latin typeface="Segoe UI" panose="020B0502040204020203" pitchFamily="34" charset="0"/>
+            </a:endParaRPr>
+          </a:p>
+        </p:txBody>
+      </p:sp>
+      <p:sp>
+        <p:nvSpPr>
           <p:cNvPr id="3" name="Content Placeholder 2"/>
           <p:cNvSpPr>
             <a:spLocks noGrp="1"/>
@@ -20517,49 +20560,6 @@
               <a:solidFill>
                 <a:schemeClr val="tx1"/>
               </a:solidFill>
-            </a:endParaRPr>
-          </a:p>
-        </p:txBody>
-      </p:sp>
-      <p:sp>
-        <p:nvSpPr>
-          <p:cNvPr id="2" name="Title 1"/>
-          <p:cNvSpPr>
-            <a:spLocks noGrp="1"/>
-          </p:cNvSpPr>
-          <p:nvPr>
-            <p:ph type="title"/>
-          </p:nvPr>
-        </p:nvSpPr>
-        <p:spPr/>
-        <p:txBody>
-          <a:bodyPr>
-            <a:normAutofit fontScale="90000"/>
-          </a:bodyPr>
-          <a:lstStyle/>
-          <a:p>
-            <a:r>
-              <a:rPr lang="en-US" sz="4900" dirty="0">
-                <a:solidFill>
-                  <a:schemeClr val="tx1"/>
-                </a:solidFill>
-                <a:cs typeface="Segoe UI" panose="020B0502040204020203" pitchFamily="34" charset="0"/>
-              </a:rPr>
-              <a:t>Customer needs</a:t>
-            </a:r>
-            <a:br>
-              <a:rPr lang="en-US" dirty="0">
-                <a:solidFill>
-                  <a:schemeClr val="tx1"/>
-                </a:solidFill>
-                <a:latin typeface="Segoe UI" panose="020B0502040204020203" pitchFamily="34" charset="0"/>
-              </a:rPr>
-            </a:br>
-            <a:endParaRPr lang="en-US" sz="3236" dirty="0">
-              <a:solidFill>
-                <a:schemeClr val="tx1"/>
-              </a:solidFill>
-              <a:latin typeface="Segoe UI" panose="020B0502040204020203" pitchFamily="34" charset="0"/>
             </a:endParaRPr>
           </a:p>
         </p:txBody>
@@ -20604,6 +20604,49 @@
       </p:grpSpPr>
       <p:sp>
         <p:nvSpPr>
+          <p:cNvPr id="2" name="Title 1"/>
+          <p:cNvSpPr>
+            <a:spLocks noGrp="1"/>
+          </p:cNvSpPr>
+          <p:nvPr>
+            <p:ph type="title"/>
+          </p:nvPr>
+        </p:nvSpPr>
+        <p:spPr/>
+        <p:txBody>
+          <a:bodyPr>
+            <a:normAutofit fontScale="90000"/>
+          </a:bodyPr>
+          <a:lstStyle/>
+          <a:p>
+            <a:r>
+              <a:rPr lang="en-US" sz="4900" dirty="0">
+                <a:solidFill>
+                  <a:schemeClr val="tx1"/>
+                </a:solidFill>
+                <a:cs typeface="Segoe UI" panose="020B0502040204020203" pitchFamily="34" charset="0"/>
+              </a:rPr>
+              <a:t>Customer objections</a:t>
+            </a:r>
+            <a:br>
+              <a:rPr lang="en-US" dirty="0">
+                <a:solidFill>
+                  <a:schemeClr val="tx1"/>
+                </a:solidFill>
+                <a:latin typeface="Segoe UI" panose="020B0502040204020203" pitchFamily="34" charset="0"/>
+              </a:rPr>
+            </a:br>
+            <a:endParaRPr lang="en-US" sz="3236" dirty="0">
+              <a:solidFill>
+                <a:schemeClr val="tx1"/>
+              </a:solidFill>
+              <a:latin typeface="Segoe UI" panose="020B0502040204020203" pitchFamily="34" charset="0"/>
+            </a:endParaRPr>
+          </a:p>
+        </p:txBody>
+      </p:sp>
+      <p:sp>
+        <p:nvSpPr>
           <p:cNvPr id="3" name="Content Placeholder 2"/>
           <p:cNvSpPr>
             <a:spLocks noGrp="1"/>
@@ -20678,49 +20721,6 @@
               <a:solidFill>
                 <a:schemeClr val="tx1"/>
               </a:solidFill>
-            </a:endParaRPr>
-          </a:p>
-        </p:txBody>
-      </p:sp>
-      <p:sp>
-        <p:nvSpPr>
-          <p:cNvPr id="2" name="Title 1"/>
-          <p:cNvSpPr>
-            <a:spLocks noGrp="1"/>
-          </p:cNvSpPr>
-          <p:nvPr>
-            <p:ph type="title"/>
-          </p:nvPr>
-        </p:nvSpPr>
-        <p:spPr/>
-        <p:txBody>
-          <a:bodyPr>
-            <a:normAutofit fontScale="90000"/>
-          </a:bodyPr>
-          <a:lstStyle/>
-          <a:p>
-            <a:r>
-              <a:rPr lang="en-US" sz="4900" dirty="0">
-                <a:solidFill>
-                  <a:schemeClr val="tx1"/>
-                </a:solidFill>
-                <a:cs typeface="Segoe UI" panose="020B0502040204020203" pitchFamily="34" charset="0"/>
-              </a:rPr>
-              <a:t>Customer objections</a:t>
-            </a:r>
-            <a:br>
-              <a:rPr lang="en-US" dirty="0">
-                <a:solidFill>
-                  <a:schemeClr val="tx1"/>
-                </a:solidFill>
-                <a:latin typeface="Segoe UI" panose="020B0502040204020203" pitchFamily="34" charset="0"/>
-              </a:rPr>
-            </a:br>
-            <a:endParaRPr lang="en-US" sz="3236" dirty="0">
-              <a:solidFill>
-                <a:schemeClr val="tx1"/>
-              </a:solidFill>
-              <a:latin typeface="Segoe UI" panose="020B0502040204020203" pitchFamily="34" charset="0"/>
             </a:endParaRPr>
           </a:p>
         </p:txBody>
@@ -20763,6 +20763,49 @@
           <a:chExt cx="0" cy="0"/>
         </a:xfrm>
       </p:grpSpPr>
+      <p:sp>
+        <p:nvSpPr>
+          <p:cNvPr id="2" name="Title 1"/>
+          <p:cNvSpPr>
+            <a:spLocks noGrp="1"/>
+          </p:cNvSpPr>
+          <p:nvPr>
+            <p:ph type="title"/>
+          </p:nvPr>
+        </p:nvSpPr>
+        <p:spPr/>
+        <p:txBody>
+          <a:bodyPr>
+            <a:normAutofit fontScale="90000"/>
+          </a:bodyPr>
+          <a:lstStyle/>
+          <a:p>
+            <a:r>
+              <a:rPr lang="en-US" sz="4900" dirty="0">
+                <a:solidFill>
+                  <a:schemeClr val="tx1"/>
+                </a:solidFill>
+                <a:cs typeface="Segoe UI" panose="020B0502040204020203" pitchFamily="34" charset="0"/>
+              </a:rPr>
+              <a:t>Common scenarios</a:t>
+            </a:r>
+            <a:br>
+              <a:rPr lang="en-US" dirty="0">
+                <a:solidFill>
+                  <a:schemeClr val="tx1"/>
+                </a:solidFill>
+                <a:latin typeface="Segoe UI" panose="020B0502040204020203" pitchFamily="34" charset="0"/>
+              </a:rPr>
+            </a:br>
+            <a:endParaRPr lang="en-US" sz="3236" dirty="0">
+              <a:solidFill>
+                <a:schemeClr val="tx1"/>
+              </a:solidFill>
+              <a:latin typeface="Segoe UI" panose="020B0502040204020203" pitchFamily="34" charset="0"/>
+            </a:endParaRPr>
+          </a:p>
+        </p:txBody>
+      </p:sp>
       <p:pic>
         <p:nvPicPr>
           <p:cNvPr id="4" name="Picture 3" descr="A common example of a Machine Learning pipeline">
@@ -20799,49 +20842,6 @@
           </a:prstGeom>
         </p:spPr>
       </p:pic>
-      <p:sp>
-        <p:nvSpPr>
-          <p:cNvPr id="2" name="Title 1"/>
-          <p:cNvSpPr>
-            <a:spLocks noGrp="1"/>
-          </p:cNvSpPr>
-          <p:nvPr>
-            <p:ph type="title"/>
-          </p:nvPr>
-        </p:nvSpPr>
-        <p:spPr/>
-        <p:txBody>
-          <a:bodyPr>
-            <a:normAutofit fontScale="90000"/>
-          </a:bodyPr>
-          <a:lstStyle/>
-          <a:p>
-            <a:r>
-              <a:rPr lang="en-US" sz="4900" dirty="0">
-                <a:solidFill>
-                  <a:schemeClr val="tx1"/>
-                </a:solidFill>
-                <a:cs typeface="Segoe UI" panose="020B0502040204020203" pitchFamily="34" charset="0"/>
-              </a:rPr>
-              <a:t>Common scenarios</a:t>
-            </a:r>
-            <a:br>
-              <a:rPr lang="en-US" dirty="0">
-                <a:solidFill>
-                  <a:schemeClr val="tx1"/>
-                </a:solidFill>
-                <a:latin typeface="Segoe UI" panose="020B0502040204020203" pitchFamily="34" charset="0"/>
-              </a:rPr>
-            </a:br>
-            <a:endParaRPr lang="en-US" sz="3236" dirty="0">
-              <a:solidFill>
-                <a:schemeClr val="tx1"/>
-              </a:solidFill>
-              <a:latin typeface="Segoe UI" panose="020B0502040204020203" pitchFamily="34" charset="0"/>
-            </a:endParaRPr>
-          </a:p>
-        </p:txBody>
-      </p:sp>
     </p:spTree>
     <p:extLst>
       <p:ext uri="{BB962C8B-B14F-4D97-AF65-F5344CB8AC3E}">
@@ -21729,6 +21729,15 @@
 </file>
 
 <file path=customXml/item1.xml><?xml version="1.0" encoding="utf-8"?>
+<p:properties xmlns:p="http://schemas.microsoft.com/office/2006/metadata/properties" xmlns:xsi="http://www.w3.org/2001/XMLSchema-instance" xmlns:pc="http://schemas.microsoft.com/office/infopath/2007/PartnerControls">
+  <documentManagement>
+    <_ip_UnifiedCompliancePolicyUIAction xmlns="http://schemas.microsoft.com/sharepoint/v3" xsi:nil="true"/>
+    <_ip_UnifiedCompliancePolicyProperties xmlns="http://schemas.microsoft.com/sharepoint/v3" xsi:nil="true"/>
+  </documentManagement>
+</p:properties>
+</file>
+
+<file path=customXml/item2.xml><?xml version="1.0" encoding="utf-8"?>
 <ct:contentTypeSchema xmlns:ct="http://schemas.microsoft.com/office/2006/metadata/contentType" xmlns:ma="http://schemas.microsoft.com/office/2006/metadata/properties/metaAttributes" ct:_="" ma:_="" ma:contentTypeName="Document" ma:contentTypeID="0x010100D15DFA3690A15B4081582BBCC6BEAC3E" ma:contentTypeVersion="9" ma:contentTypeDescription="Create a new document." ma:contentTypeScope="" ma:versionID="642da1784587cbe85a7fdbbe4dc36103">
   <xsd:schema xmlns:xsd="http://www.w3.org/2001/XMLSchema" xmlns:xs="http://www.w3.org/2001/XMLSchema" xmlns:p="http://schemas.microsoft.com/office/2006/metadata/properties" xmlns:ns1="http://schemas.microsoft.com/sharepoint/v3" xmlns:ns2="2023ac63-7b75-4916-a9ee-591457758eee" xmlns:ns3="d9c797ad-d7c3-4982-82b7-81352a75e4a5" targetNamespace="http://schemas.microsoft.com/office/2006/metadata/properties" ma:root="true" ma:fieldsID="91198b0246576053cc55dd2c67035a89" ns1:_="" ns2:_="" ns3:_="">
     <xsd:import namespace="http://schemas.microsoft.com/sharepoint/v3"/>
@@ -21930,15 +21939,6 @@
 </ct:contentTypeSchema>
 </file>
 
-<file path=customXml/item2.xml><?xml version="1.0" encoding="utf-8"?>
-<p:properties xmlns:p="http://schemas.microsoft.com/office/2006/metadata/properties" xmlns:xsi="http://www.w3.org/2001/XMLSchema-instance" xmlns:pc="http://schemas.microsoft.com/office/infopath/2007/PartnerControls">
-  <documentManagement>
-    <_ip_UnifiedCompliancePolicyUIAction xmlns="http://schemas.microsoft.com/sharepoint/v3" xsi:nil="true"/>
-    <_ip_UnifiedCompliancePolicyProperties xmlns="http://schemas.microsoft.com/sharepoint/v3" xsi:nil="true"/>
-  </documentManagement>
-</p:properties>
-</file>
-
 <file path=customXml/item3.xml><?xml version="1.0" encoding="utf-8"?>
 <?mso-contentType ?>
 <FormTemplates xmlns="http://schemas.microsoft.com/sharepoint/v3/contenttype/forms">
@@ -21949,6 +21949,24 @@
 </file>
 
 <file path=customXml/itemProps1.xml><?xml version="1.0" encoding="utf-8"?>
+<ds:datastoreItem xmlns:ds="http://schemas.openxmlformats.org/officeDocument/2006/customXml" ds:itemID="{BAF7D529-36AB-45DA-B239-2F912F2D1610}">
+  <ds:schemaRefs>
+    <ds:schemaRef ds:uri="http://purl.org/dc/terms/"/>
+    <ds:schemaRef ds:uri="http://schemas.microsoft.com/sharepoint/v3"/>
+    <ds:schemaRef ds:uri="http://purl.org/dc/dcmitype/"/>
+    <ds:schemaRef ds:uri="http://schemas.openxmlformats.org/package/2006/metadata/core-properties"/>
+    <ds:schemaRef ds:uri="http://purl.org/dc/elements/1.1/"/>
+    <ds:schemaRef ds:uri="http://schemas.microsoft.com/office/2006/metadata/properties"/>
+    <ds:schemaRef ds:uri="http://schemas.microsoft.com/office/2006/documentManagement/types"/>
+    <ds:schemaRef ds:uri="http://schemas.microsoft.com/office/infopath/2007/PartnerControls"/>
+    <ds:schemaRef ds:uri="d9c797ad-d7c3-4982-82b7-81352a75e4a5"/>
+    <ds:schemaRef ds:uri="2023ac63-7b75-4916-a9ee-591457758eee"/>
+    <ds:schemaRef ds:uri="http://www.w3.org/XML/1998/namespace"/>
+  </ds:schemaRefs>
+</ds:datastoreItem>
+</file>
+
+<file path=customXml/itemProps2.xml><?xml version="1.0" encoding="utf-8"?>
 <ds:datastoreItem xmlns:ds="http://schemas.openxmlformats.org/officeDocument/2006/customXml" ds:itemID="{255F5BEB-6AD6-480A-8556-C80C5EBC10F2}">
   <ds:schemaRefs>
     <ds:schemaRef ds:uri="http://schemas.microsoft.com/office/2006/metadata/contentType"/>
@@ -21968,24 +21986,6 @@
 </ds:datastoreItem>
 </file>
 
-<file path=customXml/itemProps2.xml><?xml version="1.0" encoding="utf-8"?>
-<ds:datastoreItem xmlns:ds="http://schemas.openxmlformats.org/officeDocument/2006/customXml" ds:itemID="{BAF7D529-36AB-45DA-B239-2F912F2D1610}">
-  <ds:schemaRefs>
-    <ds:schemaRef ds:uri="http://schemas.microsoft.com/office/2006/documentManagement/types"/>
-    <ds:schemaRef ds:uri="http://purl.org/dc/dcmitype/"/>
-    <ds:schemaRef ds:uri="http://www.w3.org/XML/1998/namespace"/>
-    <ds:schemaRef ds:uri="http://purl.org/dc/elements/1.1/"/>
-    <ds:schemaRef ds:uri="http://schemas.microsoft.com/sharepoint/v3"/>
-    <ds:schemaRef ds:uri="2023ac63-7b75-4916-a9ee-591457758eee"/>
-    <ds:schemaRef ds:uri="http://schemas.microsoft.com/office/infopath/2007/PartnerControls"/>
-    <ds:schemaRef ds:uri="http://schemas.microsoft.com/office/2006/metadata/properties"/>
-    <ds:schemaRef ds:uri="http://schemas.openxmlformats.org/package/2006/metadata/core-properties"/>
-    <ds:schemaRef ds:uri="d9c797ad-d7c3-4982-82b7-81352a75e4a5"/>
-    <ds:schemaRef ds:uri="http://purl.org/dc/terms/"/>
-  </ds:schemaRefs>
-</ds:datastoreItem>
-</file>
-
 <file path=customXml/itemProps3.xml><?xml version="1.0" encoding="utf-8"?>
 <ds:datastoreItem xmlns:ds="http://schemas.openxmlformats.org/officeDocument/2006/customXml" ds:itemID="{F18501AF-04CF-4482-BAE1-607B49DDC378}">
   <ds:schemaRefs>

</xml_diff>